<commit_message>
rework and optimization for preprocess script
</commit_message>
<xml_diff>
--- a/dokumentation_things/Roadmap Bachelor thesis.pptx
+++ b/dokumentation_things/Roadmap Bachelor thesis.pptx
@@ -6,10 +6,10 @@
     <p:sldMasterId id="2147483720" r:id="rId2"/>
   </p:sldMasterIdLst>
   <p:notesMasterIdLst>
-    <p:notesMasterId r:id="rId16"/>
+    <p:notesMasterId r:id="rId20"/>
   </p:notesMasterIdLst>
   <p:handoutMasterIdLst>
-    <p:handoutMasterId r:id="rId17"/>
+    <p:handoutMasterId r:id="rId21"/>
   </p:handoutMasterIdLst>
   <p:sldIdLst>
     <p:sldId id="384" r:id="rId3"/>
@@ -25,11 +25,15 @@
     <p:sldId id="381" r:id="rId13"/>
     <p:sldId id="382" r:id="rId14"/>
     <p:sldId id="383" r:id="rId15"/>
+    <p:sldId id="385" r:id="rId16"/>
+    <p:sldId id="386" r:id="rId17"/>
+    <p:sldId id="387" r:id="rId18"/>
+    <p:sldId id="388" r:id="rId19"/>
   </p:sldIdLst>
   <p:sldSz cx="12192000" cy="6858000"/>
   <p:notesSz cx="6858000" cy="9144000"/>
   <p:custDataLst>
-    <p:tags r:id="rId18"/>
+    <p:tags r:id="rId22"/>
   </p:custDataLst>
   <p:defaultTextStyle>
     <a:defPPr>
@@ -148,6 +152,10 @@
             <p14:sldId id="381"/>
             <p14:sldId id="382"/>
             <p14:sldId id="383"/>
+            <p14:sldId id="385"/>
+            <p14:sldId id="386"/>
+            <p14:sldId id="387"/>
+            <p14:sldId id="388"/>
           </p14:sldIdLst>
         </p14:section>
       </p14:sectionLst>
@@ -274,7 +282,7 @@
               <a:rPr lang="de-DE" smtClean="0">
                 <a:latin typeface="BMWGroupTN Condensed" pitchFamily="50" charset="0"/>
               </a:rPr>
-              <a:t>18.06.2024</a:t>
+              <a:t>27.06.2024</a:t>
             </a:fld>
             <a:endParaRPr lang="de-DE" dirty="0">
               <a:latin typeface="BMWGroupTN Condensed" pitchFamily="50" charset="0"/>
@@ -452,7 +460,7 @@
             <a:fld id="{C9ACC0F7-209C-4EE4-A1D5-BFF0CBCA9BC3}" type="datetimeFigureOut">
               <a:rPr lang="de-DE" smtClean="0"/>
               <a:pPr/>
-              <a:t>18.06.2024</a:t>
+              <a:t>27.06.2024</a:t>
             </a:fld>
             <a:endParaRPr lang="de-DE" dirty="0"/>
           </a:p>
@@ -1140,6 +1148,91 @@
     <p:extLst>
       <p:ext uri="{BB962C8B-B14F-4D97-AF65-F5344CB8AC3E}">
         <p14:creationId xmlns:p14="http://schemas.microsoft.com/office/powerpoint/2010/main" val="2121291010"/>
+      </p:ext>
+    </p:extLst>
+  </p:cSld>
+  <p:clrMapOvr>
+    <a:masterClrMapping/>
+  </p:clrMapOvr>
+</p:notes>
+</file>
+
+<file path=ppt/notesSlides/notesSlide6.xml><?xml version="1.0" encoding="utf-8"?>
+<p:notes xmlns:a="http://schemas.openxmlformats.org/drawingml/2006/main" xmlns:r="http://schemas.openxmlformats.org/officeDocument/2006/relationships" xmlns:p="http://schemas.openxmlformats.org/presentationml/2006/main">
+  <p:cSld>
+    <p:spTree>
+      <p:nvGrpSpPr>
+        <p:cNvPr id="1" name=""/>
+        <p:cNvGrpSpPr/>
+        <p:nvPr/>
+      </p:nvGrpSpPr>
+      <p:grpSpPr>
+        <a:xfrm>
+          <a:off x="0" y="0"/>
+          <a:ext cx="0" cy="0"/>
+          <a:chOff x="0" y="0"/>
+          <a:chExt cx="0" cy="0"/>
+        </a:xfrm>
+      </p:grpSpPr>
+      <p:sp>
+        <p:nvSpPr>
+          <p:cNvPr id="2" name="Slide Image Placeholder 1"/>
+          <p:cNvSpPr>
+            <a:spLocks noGrp="1" noRot="1" noChangeAspect="1"/>
+          </p:cNvSpPr>
+          <p:nvPr>
+            <p:ph type="sldImg"/>
+          </p:nvPr>
+        </p:nvSpPr>
+        <p:spPr/>
+      </p:sp>
+      <p:sp>
+        <p:nvSpPr>
+          <p:cNvPr id="3" name="Notes Placeholder 2"/>
+          <p:cNvSpPr>
+            <a:spLocks noGrp="1"/>
+          </p:cNvSpPr>
+          <p:nvPr>
+            <p:ph type="body" idx="1"/>
+          </p:nvPr>
+        </p:nvSpPr>
+        <p:spPr/>
+        <p:txBody>
+          <a:bodyPr/>
+          <a:lstStyle/>
+          <a:p>
+            <a:endParaRPr lang="en-US" dirty="0"/>
+          </a:p>
+        </p:txBody>
+      </p:sp>
+      <p:sp>
+        <p:nvSpPr>
+          <p:cNvPr id="4" name="Slide Number Placeholder 3"/>
+          <p:cNvSpPr>
+            <a:spLocks noGrp="1"/>
+          </p:cNvSpPr>
+          <p:nvPr>
+            <p:ph type="sldNum" sz="quarter" idx="5"/>
+          </p:nvPr>
+        </p:nvSpPr>
+        <p:spPr/>
+        <p:txBody>
+          <a:bodyPr/>
+          <a:lstStyle/>
+          <a:p>
+            <a:fld id="{845B7A2B-9D63-4AB1-9A7A-EE5F31796489}" type="slidenum">
+              <a:rPr lang="de-DE" smtClean="0"/>
+              <a:pPr/>
+              <a:t>14</a:t>
+            </a:fld>
+            <a:endParaRPr lang="de-DE" dirty="0"/>
+          </a:p>
+        </p:txBody>
+      </p:sp>
+    </p:spTree>
+    <p:extLst>
+      <p:ext uri="{BB962C8B-B14F-4D97-AF65-F5344CB8AC3E}">
+        <p14:creationId xmlns:p14="http://schemas.microsoft.com/office/powerpoint/2010/main" val="1898937565"/>
       </p:ext>
     </p:extLst>
   </p:cSld>
@@ -31638,6 +31731,3554 @@
     <p:extLst>
       <p:ext uri="{BB962C8B-B14F-4D97-AF65-F5344CB8AC3E}">
         <p14:creationId xmlns:p14="http://schemas.microsoft.com/office/powerpoint/2010/main" val="4024672319"/>
+      </p:ext>
+    </p:extLst>
+  </p:cSld>
+  <p:clrMapOvr>
+    <a:masterClrMapping/>
+  </p:clrMapOvr>
+</p:sld>
+</file>
+
+<file path=ppt/slides/slide14.xml><?xml version="1.0" encoding="utf-8"?>
+<p:sld xmlns:a="http://schemas.openxmlformats.org/drawingml/2006/main" xmlns:r="http://schemas.openxmlformats.org/officeDocument/2006/relationships" xmlns:p="http://schemas.openxmlformats.org/presentationml/2006/main">
+  <p:cSld>
+    <p:spTree>
+      <p:nvGrpSpPr>
+        <p:cNvPr id="1" name=""/>
+        <p:cNvGrpSpPr/>
+        <p:nvPr/>
+      </p:nvGrpSpPr>
+      <p:grpSpPr>
+        <a:xfrm>
+          <a:off x="0" y="0"/>
+          <a:ext cx="0" cy="0"/>
+          <a:chOff x="0" y="0"/>
+          <a:chExt cx="0" cy="0"/>
+        </a:xfrm>
+      </p:grpSpPr>
+      <p:sp>
+        <p:nvSpPr>
+          <p:cNvPr id="2" name="Title 1">
+            <a:extLst>
+              <a:ext uri="{FF2B5EF4-FFF2-40B4-BE49-F238E27FC236}">
+                <a16:creationId xmlns:a16="http://schemas.microsoft.com/office/drawing/2014/main" id="{A0BCD0E7-992F-D230-BFCE-EE107DFECD6B}"/>
+              </a:ext>
+            </a:extLst>
+          </p:cNvPr>
+          <p:cNvSpPr>
+            <a:spLocks noGrp="1"/>
+          </p:cNvSpPr>
+          <p:nvPr>
+            <p:ph type="title"/>
+          </p:nvPr>
+        </p:nvSpPr>
+        <p:spPr/>
+        <p:txBody>
+          <a:bodyPr/>
+          <a:lstStyle/>
+          <a:p>
+            <a:r>
+              <a:rPr lang="de-DE" dirty="0"/>
+              <a:t>Notes BA-</a:t>
+            </a:r>
+            <a:r>
+              <a:rPr lang="de-DE" dirty="0" err="1"/>
+              <a:t>Sync</a:t>
+            </a:r>
+            <a:r>
+              <a:rPr lang="de-DE" dirty="0"/>
+              <a:t> – 27.06.2024 (1/4)</a:t>
+            </a:r>
+            <a:endParaRPr lang="en-US" dirty="0"/>
+          </a:p>
+        </p:txBody>
+      </p:sp>
+      <p:sp>
+        <p:nvSpPr>
+          <p:cNvPr id="4" name="TextBox 3">
+            <a:extLst>
+              <a:ext uri="{FF2B5EF4-FFF2-40B4-BE49-F238E27FC236}">
+                <a16:creationId xmlns:a16="http://schemas.microsoft.com/office/drawing/2014/main" id="{B63C4676-3485-9FE4-56D0-08DD65E49FAC}"/>
+              </a:ext>
+            </a:extLst>
+          </p:cNvPr>
+          <p:cNvSpPr txBox="1"/>
+          <p:nvPr/>
+        </p:nvSpPr>
+        <p:spPr>
+          <a:xfrm>
+            <a:off x="580054" y="747294"/>
+            <a:ext cx="4392387" cy="161583"/>
+          </a:xfrm>
+          <a:prstGeom prst="rect">
+            <a:avLst/>
+          </a:prstGeom>
+        </p:spPr>
+        <p:txBody>
+          <a:bodyPr vert="horz" wrap="square" lIns="0" tIns="0" rIns="0" bIns="0" rtlCol="0">
+            <a:spAutoFit/>
+          </a:bodyPr>
+          <a:lstStyle/>
+          <a:p>
+            <a:pPr marL="0" indent="0" algn="l" defTabSz="914400" rtl="0" eaLnBrk="1" latinLnBrk="0" hangingPunct="1">
+              <a:lnSpc>
+                <a:spcPct val="100000"/>
+              </a:lnSpc>
+              <a:spcBef>
+                <a:spcPts val="0"/>
+              </a:spcBef>
+              <a:spcAft>
+                <a:spcPts val="600"/>
+              </a:spcAft>
+              <a:buClr>
+                <a:schemeClr val="tx2"/>
+              </a:buClr>
+              <a:buFontTx/>
+              <a:buNone/>
+            </a:pPr>
+            <a:r>
+              <a:rPr lang="de-DE" sz="1050" kern="1200" dirty="0">
+                <a:solidFill>
+                  <a:schemeClr val="accent2"/>
+                </a:solidFill>
+                <a:latin typeface="+mn-lt"/>
+                <a:ea typeface="+mn-ea"/>
+                <a:cs typeface="+mn-cs"/>
+              </a:rPr>
+              <a:t>https://cc-github.bmwgroup.net/carmenwerrlein/bachelor_thesis.git </a:t>
+            </a:r>
+            <a:endParaRPr lang="en-US" sz="1050" kern="1200" dirty="0" err="1">
+              <a:solidFill>
+                <a:schemeClr val="accent2"/>
+              </a:solidFill>
+              <a:latin typeface="+mn-lt"/>
+              <a:ea typeface="+mn-ea"/>
+              <a:cs typeface="+mn-cs"/>
+            </a:endParaRPr>
+          </a:p>
+        </p:txBody>
+      </p:sp>
+      <p:sp>
+        <p:nvSpPr>
+          <p:cNvPr id="3" name="TextBox 2">
+            <a:extLst>
+              <a:ext uri="{FF2B5EF4-FFF2-40B4-BE49-F238E27FC236}">
+                <a16:creationId xmlns:a16="http://schemas.microsoft.com/office/drawing/2014/main" id="{B2D10738-775E-CE07-40CE-A2CD87CF05A2}"/>
+              </a:ext>
+            </a:extLst>
+          </p:cNvPr>
+          <p:cNvSpPr txBox="1"/>
+          <p:nvPr/>
+        </p:nvSpPr>
+        <p:spPr>
+          <a:xfrm>
+            <a:off x="488947" y="1308987"/>
+            <a:ext cx="5023579" cy="3970318"/>
+          </a:xfrm>
+          <a:prstGeom prst="rect">
+            <a:avLst/>
+          </a:prstGeom>
+          <a:noFill/>
+        </p:spPr>
+        <p:txBody>
+          <a:bodyPr wrap="square">
+            <a:spAutoFit/>
+          </a:bodyPr>
+          <a:lstStyle/>
+          <a:p>
+            <a:r>
+              <a:rPr lang="en-US" b="1" dirty="0"/>
+              <a:t>PROGRESS:</a:t>
+            </a:r>
+          </a:p>
+          <a:p>
+            <a:pPr marL="285750" indent="-285750">
+              <a:buFont typeface="Arial" panose="020B0604020202020204" pitchFamily="34" charset="0"/>
+              <a:buChar char="•"/>
+            </a:pPr>
+            <a:r>
+              <a:rPr lang="en-US" dirty="0"/>
+              <a:t>Training on B-Ilda 4 (JC-31 Builder with RTX A4000) should work . Needs specific </a:t>
+            </a:r>
+            <a:r>
+              <a:rPr lang="en-US" dirty="0" err="1"/>
+              <a:t>Pytorch</a:t>
+            </a:r>
+            <a:r>
+              <a:rPr lang="en-US" dirty="0"/>
+              <a:t> version: torch==2.0.1. (Thanks to Martin for checking!)</a:t>
+            </a:r>
+          </a:p>
+          <a:p>
+            <a:pPr marL="285750" indent="-285750">
+              <a:buFont typeface="Arial" panose="020B0604020202020204" pitchFamily="34" charset="0"/>
+              <a:buChar char="•"/>
+            </a:pPr>
+            <a:r>
+              <a:rPr lang="en-US" dirty="0"/>
+              <a:t>Some issues with RegEx matching for Labeling</a:t>
+            </a:r>
+          </a:p>
+          <a:p>
+            <a:pPr marL="285750" indent="-285750">
+              <a:buFont typeface="Arial" panose="020B0604020202020204" pitchFamily="34" charset="0"/>
+              <a:buChar char="•"/>
+            </a:pPr>
+            <a:endParaRPr lang="en-US" dirty="0"/>
+          </a:p>
+          <a:p>
+            <a:r>
+              <a:rPr lang="en-US" b="1" dirty="0"/>
+              <a:t>OPEN TOPICS:</a:t>
+            </a:r>
+          </a:p>
+          <a:p>
+            <a:pPr marL="285750" indent="-285750">
+              <a:buFont typeface="Arial" panose="020B0604020202020204" pitchFamily="34" charset="0"/>
+              <a:buChar char="•"/>
+            </a:pPr>
+            <a:r>
+              <a:rPr lang="en-US" dirty="0"/>
+              <a:t>download data using a filter to only get new logs ? (later)</a:t>
+            </a:r>
+          </a:p>
+          <a:p>
+            <a:pPr marL="285750" indent="-285750">
+              <a:buFont typeface="Arial" panose="020B0604020202020204" pitchFamily="34" charset="0"/>
+              <a:buChar char="•"/>
+            </a:pPr>
+            <a:r>
+              <a:rPr lang="en-US" dirty="0"/>
+              <a:t>download Elasticsearch labels ? (later)</a:t>
+            </a:r>
+          </a:p>
+          <a:p>
+            <a:pPr marL="285750" indent="-285750">
+              <a:buFont typeface="Arial" panose="020B0604020202020204" pitchFamily="34" charset="0"/>
+              <a:buChar char="•"/>
+            </a:pPr>
+            <a:r>
+              <a:rPr lang="en-US" dirty="0"/>
+              <a:t>Storing Training Data ! </a:t>
+            </a:r>
+          </a:p>
+          <a:p>
+            <a:pPr marL="285750" indent="-285750">
+              <a:buFont typeface="Arial" panose="020B0604020202020204" pitchFamily="34" charset="0"/>
+              <a:buChar char="•"/>
+            </a:pPr>
+            <a:r>
+              <a:rPr lang="en-US" dirty="0"/>
+              <a:t>JC-Townhall Meeting – Presentation at some point</a:t>
+            </a:r>
+          </a:p>
+          <a:p>
+            <a:pPr marL="285750" indent="-285750">
+              <a:buFont typeface="Arial" panose="020B0604020202020204" pitchFamily="34" charset="0"/>
+              <a:buChar char="•"/>
+            </a:pPr>
+            <a:r>
+              <a:rPr lang="en-US" dirty="0"/>
+              <a:t>Presentation in Exchange Sessions at some point  </a:t>
+            </a:r>
+          </a:p>
+        </p:txBody>
+      </p:sp>
+      <p:sp>
+        <p:nvSpPr>
+          <p:cNvPr id="6" name="TextBox 5">
+            <a:extLst>
+              <a:ext uri="{FF2B5EF4-FFF2-40B4-BE49-F238E27FC236}">
+                <a16:creationId xmlns:a16="http://schemas.microsoft.com/office/drawing/2014/main" id="{B1B0104B-102B-DBCB-B33C-E2C222458604}"/>
+              </a:ext>
+            </a:extLst>
+          </p:cNvPr>
+          <p:cNvSpPr txBox="1"/>
+          <p:nvPr/>
+        </p:nvSpPr>
+        <p:spPr>
+          <a:xfrm>
+            <a:off x="6035040" y="444137"/>
+            <a:ext cx="6035040" cy="5509200"/>
+          </a:xfrm>
+          <a:prstGeom prst="rect">
+            <a:avLst/>
+          </a:prstGeom>
+        </p:spPr>
+        <p:txBody>
+          <a:bodyPr vert="horz" wrap="square" lIns="0" tIns="0" rIns="0" bIns="0" rtlCol="0">
+            <a:spAutoFit/>
+          </a:bodyPr>
+          <a:lstStyle/>
+          <a:p>
+            <a:pPr marL="0" indent="0" algn="l" defTabSz="914400" rtl="0" eaLnBrk="1" latinLnBrk="0" hangingPunct="1">
+              <a:lnSpc>
+                <a:spcPct val="100000"/>
+              </a:lnSpc>
+              <a:spcBef>
+                <a:spcPts val="0"/>
+              </a:spcBef>
+              <a:spcAft>
+                <a:spcPts val="600"/>
+              </a:spcAft>
+              <a:buClr>
+                <a:schemeClr val="tx2"/>
+              </a:buClr>
+              <a:buFontTx/>
+              <a:buNone/>
+            </a:pPr>
+            <a:r>
+              <a:rPr lang="de-DE" sz="1800" b="1" kern="1200" dirty="0">
+                <a:solidFill>
+                  <a:schemeClr val="tx1"/>
+                </a:solidFill>
+                <a:latin typeface="+mn-lt"/>
+                <a:ea typeface="+mn-ea"/>
+                <a:cs typeface="+mn-cs"/>
+              </a:rPr>
+              <a:t>ISSUES: </a:t>
+            </a:r>
+          </a:p>
+          <a:p>
+            <a:pPr marL="285750" indent="-285750" algn="l" defTabSz="914400" rtl="0" eaLnBrk="1" latinLnBrk="0" hangingPunct="1">
+              <a:lnSpc>
+                <a:spcPct val="100000"/>
+              </a:lnSpc>
+              <a:spcBef>
+                <a:spcPts val="0"/>
+              </a:spcBef>
+              <a:spcAft>
+                <a:spcPts val="600"/>
+              </a:spcAft>
+              <a:buClr>
+                <a:schemeClr val="tx2"/>
+              </a:buClr>
+              <a:buFont typeface="Arial" panose="020B0604020202020204" pitchFamily="34" charset="0"/>
+              <a:buChar char="•"/>
+            </a:pPr>
+            <a:r>
+              <a:rPr lang="de-DE" sz="1800" kern="1200" dirty="0">
+                <a:solidFill>
+                  <a:schemeClr val="tx1"/>
+                </a:solidFill>
+                <a:latin typeface="+mn-lt"/>
+                <a:ea typeface="+mn-ea"/>
+                <a:cs typeface="+mn-cs"/>
+              </a:rPr>
+              <a:t>18 logs in ‘</a:t>
+            </a:r>
+            <a:r>
+              <a:rPr lang="de-DE" sz="1800" kern="1200" dirty="0" err="1">
+                <a:solidFill>
+                  <a:schemeClr val="tx1"/>
+                </a:solidFill>
+                <a:latin typeface="+mn-lt"/>
+                <a:ea typeface="+mn-ea"/>
+                <a:cs typeface="+mn-cs"/>
+              </a:rPr>
+              <a:t>test</a:t>
+            </a:r>
+            <a:r>
+              <a:rPr lang="de-DE" sz="1800" kern="1200" dirty="0">
+                <a:solidFill>
+                  <a:schemeClr val="tx1"/>
+                </a:solidFill>
+                <a:latin typeface="+mn-lt"/>
+                <a:ea typeface="+mn-ea"/>
+                <a:cs typeface="+mn-cs"/>
+              </a:rPr>
+              <a:t> </a:t>
+            </a:r>
+            <a:r>
+              <a:rPr lang="de-DE" sz="1800" kern="1200" dirty="0" err="1">
+                <a:solidFill>
+                  <a:schemeClr val="tx1"/>
+                </a:solidFill>
+                <a:latin typeface="+mn-lt"/>
+                <a:ea typeface="+mn-ea"/>
+                <a:cs typeface="+mn-cs"/>
+              </a:rPr>
+              <a:t>batch</a:t>
+            </a:r>
+            <a:r>
+              <a:rPr lang="de-DE" dirty="0"/>
+              <a:t>‘ </a:t>
+            </a:r>
+            <a:r>
+              <a:rPr lang="de-DE" dirty="0" err="1"/>
+              <a:t>with</a:t>
+            </a:r>
+            <a:r>
+              <a:rPr lang="de-DE" sz="1800" kern="1200" dirty="0">
+                <a:solidFill>
+                  <a:schemeClr val="tx1"/>
+                </a:solidFill>
+                <a:latin typeface="+mn-lt"/>
+                <a:ea typeface="+mn-ea"/>
+                <a:cs typeface="+mn-cs"/>
+              </a:rPr>
+              <a:t> 34 </a:t>
+            </a:r>
+            <a:r>
+              <a:rPr lang="de-DE" sz="1800" kern="1200" dirty="0" err="1">
+                <a:solidFill>
+                  <a:schemeClr val="tx1"/>
+                </a:solidFill>
+                <a:latin typeface="+mn-lt"/>
+                <a:ea typeface="+mn-ea"/>
+                <a:cs typeface="+mn-cs"/>
+              </a:rPr>
+              <a:t>errors</a:t>
+            </a:r>
+            <a:r>
+              <a:rPr lang="de-DE" sz="1800" kern="1200" dirty="0">
+                <a:solidFill>
+                  <a:schemeClr val="tx1"/>
+                </a:solidFill>
+                <a:latin typeface="+mn-lt"/>
+                <a:ea typeface="+mn-ea"/>
+                <a:cs typeface="+mn-cs"/>
+              </a:rPr>
+              <a:t> </a:t>
+            </a:r>
+          </a:p>
+          <a:p>
+            <a:pPr marL="285750" indent="-285750" algn="l" defTabSz="914400" rtl="0" eaLnBrk="1" latinLnBrk="0" hangingPunct="1">
+              <a:lnSpc>
+                <a:spcPct val="100000"/>
+              </a:lnSpc>
+              <a:spcBef>
+                <a:spcPts val="0"/>
+              </a:spcBef>
+              <a:spcAft>
+                <a:spcPts val="600"/>
+              </a:spcAft>
+              <a:buClr>
+                <a:schemeClr val="tx2"/>
+              </a:buClr>
+              <a:buFont typeface="Arial" panose="020B0604020202020204" pitchFamily="34" charset="0"/>
+              <a:buChar char="•"/>
+            </a:pPr>
+            <a:r>
+              <a:rPr lang="de-DE" dirty="0" err="1"/>
+              <a:t>Reconsider</a:t>
+            </a:r>
+            <a:r>
+              <a:rPr lang="de-DE" dirty="0"/>
+              <a:t> </a:t>
+            </a:r>
+            <a:r>
+              <a:rPr lang="de-DE" dirty="0" err="1"/>
+              <a:t>keeping</a:t>
+            </a:r>
+            <a:r>
+              <a:rPr lang="de-DE" dirty="0"/>
+              <a:t> </a:t>
+            </a:r>
+            <a:r>
+              <a:rPr lang="de-DE" dirty="0" err="1"/>
+              <a:t>erros</a:t>
+            </a:r>
+            <a:r>
+              <a:rPr lang="de-DE" dirty="0"/>
+              <a:t> </a:t>
+            </a:r>
+            <a:r>
+              <a:rPr lang="de-DE" dirty="0" err="1"/>
+              <a:t>together</a:t>
+            </a:r>
+            <a:r>
+              <a:rPr lang="de-DE" dirty="0"/>
+              <a:t>?</a:t>
+            </a:r>
+          </a:p>
+          <a:p>
+            <a:pPr marL="285750" indent="-285750" algn="l" defTabSz="914400" rtl="0" eaLnBrk="1" latinLnBrk="0" hangingPunct="1">
+              <a:lnSpc>
+                <a:spcPct val="100000"/>
+              </a:lnSpc>
+              <a:spcBef>
+                <a:spcPts val="0"/>
+              </a:spcBef>
+              <a:spcAft>
+                <a:spcPts val="600"/>
+              </a:spcAft>
+              <a:buClr>
+                <a:schemeClr val="tx2"/>
+              </a:buClr>
+              <a:buFont typeface="Arial" panose="020B0604020202020204" pitchFamily="34" charset="0"/>
+              <a:buChar char="•"/>
+            </a:pPr>
+            <a:r>
+              <a:rPr lang="de-DE" dirty="0" err="1"/>
+              <a:t>Current</a:t>
+            </a:r>
+            <a:r>
+              <a:rPr lang="de-DE" dirty="0"/>
+              <a:t> </a:t>
+            </a:r>
+            <a:r>
+              <a:rPr lang="de-DE" dirty="0" err="1"/>
+              <a:t>Labeling</a:t>
+            </a:r>
+            <a:r>
+              <a:rPr lang="de-DE" dirty="0"/>
+              <a:t> </a:t>
+            </a:r>
+            <a:r>
+              <a:rPr lang="de-DE" dirty="0" err="1"/>
+              <a:t>status</a:t>
+            </a:r>
+            <a:r>
+              <a:rPr lang="de-DE" dirty="0"/>
+              <a:t>: Read and </a:t>
+            </a:r>
+            <a:r>
+              <a:rPr lang="de-DE" dirty="0" err="1"/>
+              <a:t>compile</a:t>
+            </a:r>
+            <a:r>
+              <a:rPr lang="de-DE" dirty="0"/>
+              <a:t> </a:t>
+            </a:r>
+            <a:r>
+              <a:rPr lang="de-DE" dirty="0" err="1"/>
+              <a:t>patterns</a:t>
+            </a:r>
+            <a:r>
+              <a:rPr lang="de-DE" dirty="0"/>
+              <a:t>, check all logs in dir </a:t>
+            </a:r>
+            <a:r>
+              <a:rPr lang="de-DE" dirty="0" err="1"/>
+              <a:t>for</a:t>
+            </a:r>
+            <a:r>
+              <a:rPr lang="de-DE" dirty="0"/>
+              <a:t> </a:t>
+            </a:r>
+            <a:r>
+              <a:rPr lang="de-DE" dirty="0" err="1"/>
+              <a:t>matches</a:t>
+            </a:r>
+            <a:endParaRPr lang="de-DE" dirty="0"/>
+          </a:p>
+          <a:p>
+            <a:pPr algn="l" defTabSz="914400" rtl="0" eaLnBrk="1" latinLnBrk="0" hangingPunct="1">
+              <a:lnSpc>
+                <a:spcPct val="100000"/>
+              </a:lnSpc>
+              <a:spcBef>
+                <a:spcPts val="0"/>
+              </a:spcBef>
+              <a:spcAft>
+                <a:spcPts val="600"/>
+              </a:spcAft>
+              <a:buClr>
+                <a:schemeClr val="tx2"/>
+              </a:buClr>
+            </a:pPr>
+            <a:r>
+              <a:rPr lang="de-DE" dirty="0">
+                <a:sym typeface="Wingdings" panose="05000000000000000000" pitchFamily="2" charset="2"/>
+              </a:rPr>
+              <a:t>        </a:t>
+            </a:r>
+            <a:r>
+              <a:rPr lang="de-DE" dirty="0" err="1"/>
+              <a:t>Partially</a:t>
+            </a:r>
+            <a:r>
+              <a:rPr lang="de-DE" dirty="0"/>
+              <a:t> </a:t>
+            </a:r>
+            <a:r>
+              <a:rPr lang="de-DE" dirty="0" err="1"/>
+              <a:t>works</a:t>
+            </a:r>
+            <a:r>
+              <a:rPr lang="de-DE" dirty="0"/>
+              <a:t>, </a:t>
+            </a:r>
+            <a:r>
+              <a:rPr lang="de-DE" dirty="0" err="1"/>
+              <a:t>issues</a:t>
+            </a:r>
+            <a:r>
+              <a:rPr lang="de-DE" dirty="0"/>
+              <a:t> </a:t>
+            </a:r>
+            <a:r>
+              <a:rPr lang="de-DE" dirty="0" err="1"/>
+              <a:t>with</a:t>
+            </a:r>
+            <a:r>
+              <a:rPr lang="de-DE" dirty="0"/>
+              <a:t> ‘</a:t>
+            </a:r>
+            <a:r>
+              <a:rPr lang="de-DE" dirty="0" err="1"/>
+              <a:t>subtypes</a:t>
+            </a:r>
+            <a:r>
+              <a:rPr lang="de-DE" dirty="0"/>
+              <a:t>‘ ( </a:t>
+            </a:r>
+            <a:r>
+              <a:rPr lang="de-DE" dirty="0" err="1"/>
+              <a:t>details</a:t>
+            </a:r>
+            <a:r>
+              <a:rPr lang="de-DE"/>
+              <a:t> @ </a:t>
+            </a:r>
+            <a:r>
+              <a:rPr lang="de-DE" dirty="0"/>
+              <a:t>4/4) </a:t>
+            </a:r>
+          </a:p>
+          <a:p>
+            <a:pPr marL="285750" indent="-285750" algn="l" defTabSz="914400" rtl="0" eaLnBrk="1" latinLnBrk="0" hangingPunct="1">
+              <a:lnSpc>
+                <a:spcPct val="100000"/>
+              </a:lnSpc>
+              <a:spcBef>
+                <a:spcPts val="0"/>
+              </a:spcBef>
+              <a:spcAft>
+                <a:spcPts val="600"/>
+              </a:spcAft>
+              <a:buClr>
+                <a:schemeClr val="tx2"/>
+              </a:buClr>
+              <a:buFont typeface="Arial" panose="020B0604020202020204" pitchFamily="34" charset="0"/>
+              <a:buChar char="•"/>
+            </a:pPr>
+            <a:endParaRPr lang="de-DE" dirty="0"/>
+          </a:p>
+          <a:p>
+            <a:pPr marL="285750" indent="-285750" algn="l" defTabSz="914400" rtl="0" eaLnBrk="1" latinLnBrk="0" hangingPunct="1">
+              <a:lnSpc>
+                <a:spcPct val="100000"/>
+              </a:lnSpc>
+              <a:spcBef>
+                <a:spcPts val="0"/>
+              </a:spcBef>
+              <a:spcAft>
+                <a:spcPts val="600"/>
+              </a:spcAft>
+              <a:buClr>
+                <a:schemeClr val="tx2"/>
+              </a:buClr>
+              <a:buFont typeface="Arial" panose="020B0604020202020204" pitchFamily="34" charset="0"/>
+              <a:buChar char="•"/>
+            </a:pPr>
+            <a:endParaRPr lang="de-DE" dirty="0"/>
+          </a:p>
+          <a:p>
+            <a:pPr marL="285750" indent="-285750" algn="l" defTabSz="914400" rtl="0" eaLnBrk="1" latinLnBrk="0" hangingPunct="1">
+              <a:lnSpc>
+                <a:spcPct val="100000"/>
+              </a:lnSpc>
+              <a:spcBef>
+                <a:spcPts val="0"/>
+              </a:spcBef>
+              <a:spcAft>
+                <a:spcPts val="600"/>
+              </a:spcAft>
+              <a:buClr>
+                <a:schemeClr val="tx2"/>
+              </a:buClr>
+              <a:buFont typeface="Arial" panose="020B0604020202020204" pitchFamily="34" charset="0"/>
+              <a:buChar char="•"/>
+            </a:pPr>
+            <a:endParaRPr lang="de-DE" dirty="0"/>
+          </a:p>
+          <a:p>
+            <a:pPr marL="285750" indent="-285750" algn="l" defTabSz="914400" rtl="0" eaLnBrk="1" latinLnBrk="0" hangingPunct="1">
+              <a:lnSpc>
+                <a:spcPct val="100000"/>
+              </a:lnSpc>
+              <a:spcBef>
+                <a:spcPts val="0"/>
+              </a:spcBef>
+              <a:spcAft>
+                <a:spcPts val="600"/>
+              </a:spcAft>
+              <a:buClr>
+                <a:schemeClr val="tx2"/>
+              </a:buClr>
+              <a:buFont typeface="Arial" panose="020B0604020202020204" pitchFamily="34" charset="0"/>
+              <a:buChar char="•"/>
+            </a:pPr>
+            <a:endParaRPr lang="de-DE" dirty="0"/>
+          </a:p>
+          <a:p>
+            <a:pPr marL="285750" indent="-285750" algn="l" defTabSz="914400" rtl="0" eaLnBrk="1" latinLnBrk="0" hangingPunct="1">
+              <a:lnSpc>
+                <a:spcPct val="100000"/>
+              </a:lnSpc>
+              <a:spcBef>
+                <a:spcPts val="0"/>
+              </a:spcBef>
+              <a:spcAft>
+                <a:spcPts val="600"/>
+              </a:spcAft>
+              <a:buClr>
+                <a:schemeClr val="tx2"/>
+              </a:buClr>
+              <a:buFont typeface="Arial" panose="020B0604020202020204" pitchFamily="34" charset="0"/>
+              <a:buChar char="•"/>
+            </a:pPr>
+            <a:endParaRPr lang="de-DE" dirty="0"/>
+          </a:p>
+          <a:p>
+            <a:pPr marL="285750" indent="-285750" algn="l" defTabSz="914400" rtl="0" eaLnBrk="1" latinLnBrk="0" hangingPunct="1">
+              <a:lnSpc>
+                <a:spcPct val="100000"/>
+              </a:lnSpc>
+              <a:spcBef>
+                <a:spcPts val="0"/>
+              </a:spcBef>
+              <a:spcAft>
+                <a:spcPts val="600"/>
+              </a:spcAft>
+              <a:buClr>
+                <a:schemeClr val="tx2"/>
+              </a:buClr>
+              <a:buFont typeface="Arial" panose="020B0604020202020204" pitchFamily="34" charset="0"/>
+              <a:buChar char="•"/>
+            </a:pPr>
+            <a:endParaRPr lang="de-DE" dirty="0"/>
+          </a:p>
+          <a:p>
+            <a:pPr marL="285750" indent="-285750" algn="l" defTabSz="914400" rtl="0" eaLnBrk="1" latinLnBrk="0" hangingPunct="1">
+              <a:lnSpc>
+                <a:spcPct val="100000"/>
+              </a:lnSpc>
+              <a:spcBef>
+                <a:spcPts val="0"/>
+              </a:spcBef>
+              <a:spcAft>
+                <a:spcPts val="600"/>
+              </a:spcAft>
+              <a:buClr>
+                <a:schemeClr val="tx2"/>
+              </a:buClr>
+              <a:buFont typeface="Arial" panose="020B0604020202020204" pitchFamily="34" charset="0"/>
+              <a:buChar char="•"/>
+            </a:pPr>
+            <a:endParaRPr lang="de-DE" dirty="0"/>
+          </a:p>
+          <a:p>
+            <a:pPr marL="285750" indent="-285750" algn="l" defTabSz="914400" rtl="0" eaLnBrk="1" latinLnBrk="0" hangingPunct="1">
+              <a:lnSpc>
+                <a:spcPct val="100000"/>
+              </a:lnSpc>
+              <a:spcBef>
+                <a:spcPts val="0"/>
+              </a:spcBef>
+              <a:spcAft>
+                <a:spcPts val="600"/>
+              </a:spcAft>
+              <a:buClr>
+                <a:schemeClr val="tx2"/>
+              </a:buClr>
+              <a:buFont typeface="Arial" panose="020B0604020202020204" pitchFamily="34" charset="0"/>
+              <a:buChar char="•"/>
+            </a:pPr>
+            <a:r>
+              <a:rPr lang="de-DE" b="1" dirty="0"/>
+              <a:t>TODO</a:t>
+            </a:r>
+            <a:r>
+              <a:rPr lang="de-DE" dirty="0"/>
+              <a:t>: </a:t>
+            </a:r>
+            <a:r>
+              <a:rPr lang="de-DE" dirty="0" err="1"/>
+              <a:t>extract</a:t>
+            </a:r>
+            <a:r>
+              <a:rPr lang="de-DE" dirty="0"/>
+              <a:t> ID and save </a:t>
+            </a:r>
+            <a:r>
+              <a:rPr lang="de-DE" dirty="0" err="1"/>
+              <a:t>with</a:t>
+            </a:r>
+            <a:r>
+              <a:rPr lang="de-DE" dirty="0"/>
+              <a:t> </a:t>
+            </a:r>
+            <a:r>
+              <a:rPr lang="de-DE" dirty="0" err="1"/>
+              <a:t>label</a:t>
+            </a:r>
+            <a:endParaRPr lang="de-DE" dirty="0"/>
+          </a:p>
+          <a:p>
+            <a:pPr marL="285750" indent="-285750" algn="l" defTabSz="914400" rtl="0" eaLnBrk="1" latinLnBrk="0" hangingPunct="1">
+              <a:lnSpc>
+                <a:spcPct val="100000"/>
+              </a:lnSpc>
+              <a:spcBef>
+                <a:spcPts val="0"/>
+              </a:spcBef>
+              <a:spcAft>
+                <a:spcPts val="600"/>
+              </a:spcAft>
+              <a:buClr>
+                <a:schemeClr val="tx2"/>
+              </a:buClr>
+              <a:buFont typeface="Arial" panose="020B0604020202020204" pitchFamily="34" charset="0"/>
+              <a:buChar char="•"/>
+            </a:pPr>
+            <a:r>
+              <a:rPr lang="de-DE" dirty="0" err="1"/>
+              <a:t>How</a:t>
+            </a:r>
+            <a:r>
+              <a:rPr lang="de-DE" dirty="0"/>
+              <a:t> </a:t>
+            </a:r>
+            <a:r>
+              <a:rPr lang="de-DE" dirty="0" err="1"/>
+              <a:t>to</a:t>
+            </a:r>
+            <a:r>
+              <a:rPr lang="de-DE" dirty="0"/>
+              <a:t> </a:t>
+            </a:r>
+            <a:r>
+              <a:rPr lang="de-DE" dirty="0" err="1"/>
+              <a:t>map</a:t>
+            </a:r>
+            <a:r>
+              <a:rPr lang="de-DE" dirty="0"/>
+              <a:t> </a:t>
+            </a:r>
+            <a:r>
+              <a:rPr lang="de-DE" dirty="0" err="1"/>
+              <a:t>labels</a:t>
+            </a:r>
+            <a:r>
+              <a:rPr lang="de-DE" dirty="0"/>
+              <a:t> </a:t>
+            </a:r>
+            <a:r>
+              <a:rPr lang="de-DE" dirty="0" err="1"/>
+              <a:t>to</a:t>
+            </a:r>
+            <a:r>
+              <a:rPr lang="de-DE" dirty="0"/>
+              <a:t> </a:t>
+            </a:r>
+            <a:r>
+              <a:rPr lang="de-DE" dirty="0" err="1"/>
+              <a:t>error</a:t>
+            </a:r>
+            <a:r>
+              <a:rPr lang="de-DE" dirty="0"/>
+              <a:t> type (</a:t>
+            </a:r>
+            <a:r>
+              <a:rPr lang="de-DE" dirty="0" err="1"/>
+              <a:t>numerical</a:t>
+            </a:r>
+            <a:r>
+              <a:rPr lang="de-DE" dirty="0"/>
+              <a:t>, </a:t>
+            </a:r>
+            <a:r>
+              <a:rPr lang="de-DE" dirty="0" err="1"/>
+              <a:t>categorical</a:t>
+            </a:r>
+            <a:r>
+              <a:rPr lang="de-DE" dirty="0"/>
+              <a:t>, …?)  </a:t>
+            </a:r>
+          </a:p>
+          <a:p>
+            <a:pPr marL="285750" indent="-285750" algn="l" defTabSz="914400" rtl="0" eaLnBrk="1" latinLnBrk="0" hangingPunct="1">
+              <a:lnSpc>
+                <a:spcPct val="100000"/>
+              </a:lnSpc>
+              <a:spcBef>
+                <a:spcPts val="0"/>
+              </a:spcBef>
+              <a:spcAft>
+                <a:spcPts val="600"/>
+              </a:spcAft>
+              <a:buClr>
+                <a:schemeClr val="tx2"/>
+              </a:buClr>
+              <a:buFont typeface="Arial" panose="020B0604020202020204" pitchFamily="34" charset="0"/>
+              <a:buChar char="•"/>
+            </a:pPr>
+            <a:endParaRPr lang="en-US" sz="1800" kern="1200" dirty="0" err="1">
+              <a:solidFill>
+                <a:schemeClr val="tx1"/>
+              </a:solidFill>
+              <a:latin typeface="+mn-lt"/>
+              <a:ea typeface="+mn-ea"/>
+              <a:cs typeface="+mn-cs"/>
+            </a:endParaRPr>
+          </a:p>
+        </p:txBody>
+      </p:sp>
+      <p:pic>
+        <p:nvPicPr>
+          <p:cNvPr id="8" name="Picture 7">
+            <a:extLst>
+              <a:ext uri="{FF2B5EF4-FFF2-40B4-BE49-F238E27FC236}">
+                <a16:creationId xmlns:a16="http://schemas.microsoft.com/office/drawing/2014/main" id="{2F709D92-EADA-E556-FD45-2B6DCF1FFF94}"/>
+              </a:ext>
+            </a:extLst>
+          </p:cNvPr>
+          <p:cNvPicPr>
+            <a:picLocks noChangeAspect="1"/>
+          </p:cNvPicPr>
+          <p:nvPr/>
+        </p:nvPicPr>
+        <p:blipFill>
+          <a:blip r:embed="rId3"/>
+          <a:stretch>
+            <a:fillRect/>
+          </a:stretch>
+        </p:blipFill>
+        <p:spPr>
+          <a:xfrm>
+            <a:off x="6096000" y="2497183"/>
+            <a:ext cx="5847330" cy="2124892"/>
+          </a:xfrm>
+          <a:prstGeom prst="rect">
+            <a:avLst/>
+          </a:prstGeom>
+        </p:spPr>
+      </p:pic>
+    </p:spTree>
+    <p:extLst>
+      <p:ext uri="{BB962C8B-B14F-4D97-AF65-F5344CB8AC3E}">
+        <p14:creationId xmlns:p14="http://schemas.microsoft.com/office/powerpoint/2010/main" val="3353005350"/>
+      </p:ext>
+    </p:extLst>
+  </p:cSld>
+  <p:clrMapOvr>
+    <a:masterClrMapping/>
+  </p:clrMapOvr>
+</p:sld>
+</file>
+
+<file path=ppt/slides/slide15.xml><?xml version="1.0" encoding="utf-8"?>
+<p:sld xmlns:a="http://schemas.openxmlformats.org/drawingml/2006/main" xmlns:r="http://schemas.openxmlformats.org/officeDocument/2006/relationships" xmlns:p="http://schemas.openxmlformats.org/presentationml/2006/main">
+  <p:cSld>
+    <p:spTree>
+      <p:nvGrpSpPr>
+        <p:cNvPr id="1" name=""/>
+        <p:cNvGrpSpPr/>
+        <p:nvPr/>
+      </p:nvGrpSpPr>
+      <p:grpSpPr>
+        <a:xfrm>
+          <a:off x="0" y="0"/>
+          <a:ext cx="0" cy="0"/>
+          <a:chOff x="0" y="0"/>
+          <a:chExt cx="0" cy="0"/>
+        </a:xfrm>
+      </p:grpSpPr>
+      <p:sp>
+        <p:nvSpPr>
+          <p:cNvPr id="2" name="Title 1">
+            <a:extLst>
+              <a:ext uri="{FF2B5EF4-FFF2-40B4-BE49-F238E27FC236}">
+                <a16:creationId xmlns:a16="http://schemas.microsoft.com/office/drawing/2014/main" id="{CC602EF1-3F43-7235-3C14-52EE7D7F06A7}"/>
+              </a:ext>
+            </a:extLst>
+          </p:cNvPr>
+          <p:cNvSpPr>
+            <a:spLocks noGrp="1"/>
+          </p:cNvSpPr>
+          <p:nvPr>
+            <p:ph type="title"/>
+          </p:nvPr>
+        </p:nvSpPr>
+        <p:spPr/>
+        <p:txBody>
+          <a:bodyPr/>
+          <a:lstStyle/>
+          <a:p>
+            <a:r>
+              <a:rPr lang="de-DE" dirty="0"/>
+              <a:t>Notes BA-</a:t>
+            </a:r>
+            <a:r>
+              <a:rPr lang="de-DE" dirty="0" err="1"/>
+              <a:t>Sync</a:t>
+            </a:r>
+            <a:r>
+              <a:rPr lang="de-DE" dirty="0"/>
+              <a:t> – 27.06.2024 (2/4)</a:t>
+            </a:r>
+            <a:endParaRPr lang="en-US" dirty="0"/>
+          </a:p>
+        </p:txBody>
+      </p:sp>
+      <p:sp>
+        <p:nvSpPr>
+          <p:cNvPr id="4" name="TextBox 3">
+            <a:extLst>
+              <a:ext uri="{FF2B5EF4-FFF2-40B4-BE49-F238E27FC236}">
+                <a16:creationId xmlns:a16="http://schemas.microsoft.com/office/drawing/2014/main" id="{0D4094F1-6499-3E15-8285-4EA7170BBB14}"/>
+              </a:ext>
+            </a:extLst>
+          </p:cNvPr>
+          <p:cNvSpPr txBox="1"/>
+          <p:nvPr/>
+        </p:nvSpPr>
+        <p:spPr>
+          <a:xfrm>
+            <a:off x="226422" y="862149"/>
+            <a:ext cx="11617235" cy="5001369"/>
+          </a:xfrm>
+          <a:prstGeom prst="rect">
+            <a:avLst/>
+          </a:prstGeom>
+        </p:spPr>
+        <p:txBody>
+          <a:bodyPr vert="horz" wrap="square" lIns="0" tIns="0" rIns="0" bIns="0" rtlCol="0">
+            <a:spAutoFit/>
+          </a:bodyPr>
+          <a:lstStyle/>
+          <a:p>
+            <a:pPr marL="0" indent="0" algn="l" defTabSz="914400" rtl="0" eaLnBrk="1" latinLnBrk="0" hangingPunct="1">
+              <a:lnSpc>
+                <a:spcPct val="100000"/>
+              </a:lnSpc>
+              <a:spcBef>
+                <a:spcPts val="0"/>
+              </a:spcBef>
+              <a:spcAft>
+                <a:spcPts val="600"/>
+              </a:spcAft>
+              <a:buClr>
+                <a:schemeClr val="tx2"/>
+              </a:buClr>
+              <a:buFontTx/>
+              <a:buNone/>
+            </a:pPr>
+            <a:r>
+              <a:rPr lang="de-DE" sz="1000" kern="1200" dirty="0" err="1">
+                <a:solidFill>
+                  <a:schemeClr val="tx1"/>
+                </a:solidFill>
+                <a:latin typeface="+mn-lt"/>
+                <a:ea typeface="+mn-ea"/>
+                <a:cs typeface="+mn-cs"/>
+              </a:rPr>
+              <a:t>What</a:t>
+            </a:r>
+            <a:r>
+              <a:rPr lang="de-DE" sz="1000" kern="1200" dirty="0">
+                <a:solidFill>
+                  <a:schemeClr val="tx1"/>
+                </a:solidFill>
+                <a:latin typeface="+mn-lt"/>
+                <a:ea typeface="+mn-ea"/>
+                <a:cs typeface="+mn-cs"/>
+              </a:rPr>
+              <a:t> </a:t>
+            </a:r>
+            <a:r>
+              <a:rPr lang="de-DE" sz="1000" kern="1200" dirty="0" err="1">
+                <a:solidFill>
+                  <a:schemeClr val="tx1"/>
+                </a:solidFill>
+                <a:latin typeface="+mn-lt"/>
+                <a:ea typeface="+mn-ea"/>
+                <a:cs typeface="+mn-cs"/>
+              </a:rPr>
+              <a:t>happened</a:t>
+            </a:r>
+            <a:r>
+              <a:rPr lang="de-DE" sz="1000" kern="1200" dirty="0">
+                <a:solidFill>
+                  <a:schemeClr val="tx1"/>
+                </a:solidFill>
+                <a:latin typeface="+mn-lt"/>
+                <a:ea typeface="+mn-ea"/>
+                <a:cs typeface="+mn-cs"/>
+              </a:rPr>
+              <a:t> </a:t>
+            </a:r>
+            <a:r>
+              <a:rPr lang="de-DE" sz="1000" kern="1200" dirty="0" err="1">
+                <a:solidFill>
+                  <a:schemeClr val="tx1"/>
+                </a:solidFill>
+                <a:latin typeface="+mn-lt"/>
+                <a:ea typeface="+mn-ea"/>
+                <a:cs typeface="+mn-cs"/>
+              </a:rPr>
+              <a:t>until</a:t>
+            </a:r>
+            <a:r>
+              <a:rPr lang="de-DE" sz="1000" kern="1200" dirty="0">
+                <a:solidFill>
+                  <a:schemeClr val="tx1"/>
+                </a:solidFill>
+                <a:latin typeface="+mn-lt"/>
+                <a:ea typeface="+mn-ea"/>
+                <a:cs typeface="+mn-cs"/>
+              </a:rPr>
+              <a:t> </a:t>
+            </a:r>
+            <a:r>
+              <a:rPr lang="de-DE" sz="1000" kern="1200" dirty="0" err="1">
+                <a:solidFill>
+                  <a:schemeClr val="tx1"/>
+                </a:solidFill>
+                <a:latin typeface="+mn-lt"/>
+                <a:ea typeface="+mn-ea"/>
+                <a:cs typeface="+mn-cs"/>
+              </a:rPr>
+              <a:t>now</a:t>
+            </a:r>
+            <a:r>
+              <a:rPr lang="de-DE" sz="1000" kern="1200" dirty="0">
+                <a:solidFill>
+                  <a:schemeClr val="tx1"/>
+                </a:solidFill>
+                <a:latin typeface="+mn-lt"/>
+                <a:ea typeface="+mn-ea"/>
+                <a:cs typeface="+mn-cs"/>
+              </a:rPr>
+              <a:t>: </a:t>
+            </a:r>
+          </a:p>
+          <a:p>
+            <a:pPr marL="342900" indent="-342900" algn="l" defTabSz="914400" rtl="0" eaLnBrk="1" latinLnBrk="0" hangingPunct="1">
+              <a:lnSpc>
+                <a:spcPct val="100000"/>
+              </a:lnSpc>
+              <a:spcBef>
+                <a:spcPts val="0"/>
+              </a:spcBef>
+              <a:spcAft>
+                <a:spcPts val="600"/>
+              </a:spcAft>
+              <a:buClr>
+                <a:schemeClr val="tx2"/>
+              </a:buClr>
+              <a:buFontTx/>
+              <a:buAutoNum type="arabicPeriod"/>
+            </a:pPr>
+            <a:r>
+              <a:rPr lang="de-DE" sz="1000" dirty="0"/>
+              <a:t>Onboarding</a:t>
+            </a:r>
+          </a:p>
+          <a:p>
+            <a:pPr marL="342900" indent="-342900" algn="l" defTabSz="914400" rtl="0" eaLnBrk="1" latinLnBrk="0" hangingPunct="1">
+              <a:lnSpc>
+                <a:spcPct val="100000"/>
+              </a:lnSpc>
+              <a:spcBef>
+                <a:spcPts val="0"/>
+              </a:spcBef>
+              <a:spcAft>
+                <a:spcPts val="600"/>
+              </a:spcAft>
+              <a:buClr>
+                <a:schemeClr val="tx2"/>
+              </a:buClr>
+              <a:buFontTx/>
+              <a:buAutoNum type="arabicPeriod"/>
+            </a:pPr>
+            <a:r>
+              <a:rPr lang="de-DE" sz="1000" dirty="0"/>
+              <a:t>Research, Paper </a:t>
+            </a:r>
+            <a:r>
+              <a:rPr lang="de-DE" sz="1000" dirty="0" err="1"/>
+              <a:t>reading</a:t>
+            </a:r>
+            <a:r>
+              <a:rPr lang="de-DE" sz="1000" dirty="0"/>
+              <a:t> </a:t>
+            </a:r>
+            <a:r>
+              <a:rPr lang="de-DE" sz="1000" dirty="0" err="1"/>
+              <a:t>prepwork</a:t>
+            </a:r>
+            <a:endParaRPr lang="de-DE" sz="1000" dirty="0"/>
+          </a:p>
+          <a:p>
+            <a:pPr marL="342900" indent="-342900" algn="l" defTabSz="914400" rtl="0" eaLnBrk="1" latinLnBrk="0" hangingPunct="1">
+              <a:lnSpc>
+                <a:spcPct val="100000"/>
+              </a:lnSpc>
+              <a:spcBef>
+                <a:spcPts val="0"/>
+              </a:spcBef>
+              <a:spcAft>
+                <a:spcPts val="600"/>
+              </a:spcAft>
+              <a:buClr>
+                <a:schemeClr val="tx2"/>
+              </a:buClr>
+              <a:buFontTx/>
+              <a:buAutoNum type="arabicPeriod"/>
+            </a:pPr>
+            <a:r>
+              <a:rPr lang="de-DE" sz="1000" kern="1200" dirty="0">
+                <a:solidFill>
+                  <a:schemeClr val="tx1"/>
+                </a:solidFill>
+                <a:latin typeface="+mn-lt"/>
+                <a:ea typeface="+mn-ea"/>
+                <a:cs typeface="+mn-cs"/>
+              </a:rPr>
+              <a:t>Logs </a:t>
+            </a:r>
+            <a:r>
+              <a:rPr lang="de-DE" sz="1000" kern="1200" dirty="0" err="1">
+                <a:solidFill>
+                  <a:schemeClr val="tx1"/>
+                </a:solidFill>
+                <a:latin typeface="+mn-lt"/>
+                <a:ea typeface="+mn-ea"/>
+                <a:cs typeface="+mn-cs"/>
+              </a:rPr>
+              <a:t>to</a:t>
+            </a:r>
+            <a:r>
+              <a:rPr lang="de-DE" sz="1000" kern="1200" dirty="0">
+                <a:solidFill>
+                  <a:schemeClr val="tx1"/>
+                </a:solidFill>
+                <a:latin typeface="+mn-lt"/>
+                <a:ea typeface="+mn-ea"/>
+                <a:cs typeface="+mn-cs"/>
+              </a:rPr>
+              <a:t> </a:t>
+            </a:r>
+            <a:r>
+              <a:rPr lang="de-DE" sz="1000" kern="1200" dirty="0" err="1">
+                <a:solidFill>
+                  <a:schemeClr val="tx1"/>
+                </a:solidFill>
+                <a:latin typeface="+mn-lt"/>
+                <a:ea typeface="+mn-ea"/>
+                <a:cs typeface="+mn-cs"/>
+              </a:rPr>
+              <a:t>aws</a:t>
+            </a:r>
+            <a:r>
+              <a:rPr lang="de-DE" sz="1000" kern="1200" dirty="0">
+                <a:solidFill>
+                  <a:schemeClr val="tx1"/>
+                </a:solidFill>
+                <a:latin typeface="+mn-lt"/>
+                <a:ea typeface="+mn-ea"/>
+                <a:cs typeface="+mn-cs"/>
+              </a:rPr>
+              <a:t> ( Sascha)</a:t>
+            </a:r>
+          </a:p>
+          <a:p>
+            <a:pPr marL="342900" indent="-342900" algn="l" defTabSz="914400" rtl="0" eaLnBrk="1" latinLnBrk="0" hangingPunct="1">
+              <a:lnSpc>
+                <a:spcPct val="100000"/>
+              </a:lnSpc>
+              <a:spcBef>
+                <a:spcPts val="0"/>
+              </a:spcBef>
+              <a:spcAft>
+                <a:spcPts val="600"/>
+              </a:spcAft>
+              <a:buClr>
+                <a:schemeClr val="tx2"/>
+              </a:buClr>
+              <a:buFontTx/>
+              <a:buAutoNum type="arabicPeriod"/>
+            </a:pPr>
+            <a:r>
+              <a:rPr lang="de-DE" sz="1000" kern="1200" dirty="0" err="1">
+                <a:solidFill>
+                  <a:schemeClr val="tx1"/>
+                </a:solidFill>
+                <a:latin typeface="+mn-lt"/>
+                <a:ea typeface="+mn-ea"/>
+                <a:cs typeface="+mn-cs"/>
+              </a:rPr>
+              <a:t>Script</a:t>
+            </a:r>
+            <a:r>
+              <a:rPr lang="de-DE" sz="1000" kern="1200" dirty="0">
+                <a:solidFill>
+                  <a:schemeClr val="tx1"/>
+                </a:solidFill>
+                <a:latin typeface="+mn-lt"/>
+                <a:ea typeface="+mn-ea"/>
+                <a:cs typeface="+mn-cs"/>
+              </a:rPr>
+              <a:t> </a:t>
+            </a:r>
+            <a:r>
+              <a:rPr lang="de-DE" sz="1000" kern="1200" dirty="0" err="1">
+                <a:solidFill>
+                  <a:schemeClr val="tx1"/>
+                </a:solidFill>
+                <a:latin typeface="+mn-lt"/>
+                <a:ea typeface="+mn-ea"/>
+                <a:cs typeface="+mn-cs"/>
+              </a:rPr>
+              <a:t>to</a:t>
+            </a:r>
+            <a:r>
+              <a:rPr lang="de-DE" sz="1000" kern="1200" dirty="0">
+                <a:solidFill>
+                  <a:schemeClr val="tx1"/>
+                </a:solidFill>
+                <a:latin typeface="+mn-lt"/>
+                <a:ea typeface="+mn-ea"/>
+                <a:cs typeface="+mn-cs"/>
+              </a:rPr>
+              <a:t> </a:t>
+            </a:r>
+            <a:r>
+              <a:rPr lang="de-DE" sz="1000" kern="1200" dirty="0" err="1">
+                <a:solidFill>
+                  <a:schemeClr val="tx1"/>
+                </a:solidFill>
+                <a:latin typeface="+mn-lt"/>
+                <a:ea typeface="+mn-ea"/>
+                <a:cs typeface="+mn-cs"/>
+              </a:rPr>
+              <a:t>crop</a:t>
+            </a:r>
+            <a:r>
+              <a:rPr lang="de-DE" sz="1000" kern="1200" dirty="0">
+                <a:solidFill>
+                  <a:schemeClr val="tx1"/>
+                </a:solidFill>
+                <a:latin typeface="+mn-lt"/>
+                <a:ea typeface="+mn-ea"/>
+                <a:cs typeface="+mn-cs"/>
+              </a:rPr>
+              <a:t> logs</a:t>
+            </a:r>
+          </a:p>
+          <a:p>
+            <a:pPr marL="742950" lvl="1" indent="-285750">
+              <a:spcAft>
+                <a:spcPts val="600"/>
+              </a:spcAft>
+              <a:buClr>
+                <a:schemeClr val="tx2"/>
+              </a:buClr>
+              <a:buFont typeface="Arial" panose="020B0604020202020204" pitchFamily="34" charset="0"/>
+              <a:buChar char="•"/>
+            </a:pPr>
+            <a:r>
+              <a:rPr lang="de-DE" sz="1000" kern="1200" dirty="0">
+                <a:solidFill>
+                  <a:schemeClr val="tx1"/>
+                </a:solidFill>
+                <a:latin typeface="+mn-lt"/>
+                <a:ea typeface="+mn-ea"/>
+                <a:cs typeface="+mn-cs"/>
+              </a:rPr>
+              <a:t>Search </a:t>
+            </a:r>
+            <a:r>
+              <a:rPr lang="de-DE" sz="1000" kern="1200" dirty="0" err="1">
+                <a:solidFill>
+                  <a:schemeClr val="tx1"/>
+                </a:solidFill>
+                <a:latin typeface="+mn-lt"/>
+                <a:ea typeface="+mn-ea"/>
+                <a:cs typeface="+mn-cs"/>
+              </a:rPr>
+              <a:t>for</a:t>
+            </a:r>
+            <a:r>
+              <a:rPr lang="de-DE" sz="1000" dirty="0"/>
+              <a:t>: </a:t>
+            </a:r>
+            <a:r>
+              <a:rPr lang="de-DE" sz="1000" b="1" dirty="0"/>
+              <a:t>„</a:t>
+            </a:r>
+            <a:r>
+              <a:rPr lang="de-DE" sz="1000" b="1" dirty="0" err="1"/>
+              <a:t>failed</a:t>
+            </a:r>
+            <a:r>
+              <a:rPr lang="de-DE" sz="1000" b="1" dirty="0"/>
+              <a:t>“: </a:t>
+            </a:r>
+            <a:r>
+              <a:rPr lang="de-DE" sz="1000" b="1" dirty="0" err="1"/>
+              <a:t>true</a:t>
+            </a:r>
+            <a:r>
+              <a:rPr lang="de-DE" sz="1000" b="1" kern="1200" dirty="0">
+                <a:solidFill>
+                  <a:schemeClr val="tx1"/>
+                </a:solidFill>
+                <a:latin typeface="+mn-lt"/>
+                <a:ea typeface="+mn-ea"/>
+                <a:cs typeface="+mn-cs"/>
+              </a:rPr>
+              <a:t> </a:t>
+            </a:r>
+          </a:p>
+          <a:p>
+            <a:pPr marL="742950" lvl="1" indent="-285750">
+              <a:spcAft>
+                <a:spcPts val="600"/>
+              </a:spcAft>
+              <a:buClr>
+                <a:schemeClr val="tx2"/>
+              </a:buClr>
+              <a:buFont typeface="Arial" panose="020B0604020202020204" pitchFamily="34" charset="0"/>
+              <a:buChar char="•"/>
+            </a:pPr>
+            <a:r>
+              <a:rPr lang="de-DE" sz="1000" kern="1200" dirty="0">
+                <a:solidFill>
+                  <a:schemeClr val="tx1"/>
+                </a:solidFill>
+                <a:latin typeface="+mn-lt"/>
+                <a:ea typeface="+mn-ea"/>
+                <a:cs typeface="+mn-cs"/>
+              </a:rPr>
+              <a:t>Find </a:t>
+            </a:r>
+            <a:r>
+              <a:rPr lang="de-DE" sz="1000" kern="1200" dirty="0" err="1">
+                <a:solidFill>
+                  <a:schemeClr val="tx1"/>
+                </a:solidFill>
+                <a:latin typeface="+mn-lt"/>
+                <a:ea typeface="+mn-ea"/>
+                <a:cs typeface="+mn-cs"/>
+              </a:rPr>
+              <a:t>interesting</a:t>
+            </a:r>
+            <a:r>
+              <a:rPr lang="de-DE" sz="1000" kern="1200" dirty="0">
+                <a:solidFill>
+                  <a:schemeClr val="tx1"/>
+                </a:solidFill>
+                <a:latin typeface="+mn-lt"/>
+                <a:ea typeface="+mn-ea"/>
+                <a:cs typeface="+mn-cs"/>
+              </a:rPr>
+              <a:t> </a:t>
+            </a:r>
+            <a:r>
+              <a:rPr lang="de-DE" sz="1000" kern="1200" dirty="0" err="1">
+                <a:solidFill>
+                  <a:schemeClr val="tx1"/>
+                </a:solidFill>
+                <a:latin typeface="+mn-lt"/>
+                <a:ea typeface="+mn-ea"/>
+                <a:cs typeface="+mn-cs"/>
+              </a:rPr>
+              <a:t>keys</a:t>
+            </a:r>
+            <a:r>
+              <a:rPr lang="de-DE" sz="1000" kern="1200" dirty="0">
+                <a:solidFill>
+                  <a:schemeClr val="tx1"/>
+                </a:solidFill>
+                <a:latin typeface="+mn-lt"/>
+                <a:ea typeface="+mn-ea"/>
+                <a:cs typeface="+mn-cs"/>
+              </a:rPr>
+              <a:t> </a:t>
+            </a:r>
+            <a:r>
+              <a:rPr lang="de-DE" sz="1000" kern="1200" dirty="0" err="1">
+                <a:solidFill>
+                  <a:schemeClr val="tx1"/>
+                </a:solidFill>
+                <a:latin typeface="+mn-lt"/>
+                <a:ea typeface="+mn-ea"/>
+                <a:cs typeface="+mn-cs"/>
+              </a:rPr>
+              <a:t>before</a:t>
+            </a:r>
+            <a:r>
+              <a:rPr lang="de-DE" sz="1000" kern="1200" dirty="0">
+                <a:solidFill>
+                  <a:schemeClr val="tx1"/>
+                </a:solidFill>
+                <a:latin typeface="+mn-lt"/>
+                <a:ea typeface="+mn-ea"/>
+                <a:cs typeface="+mn-cs"/>
+              </a:rPr>
+              <a:t> </a:t>
+            </a:r>
+            <a:r>
+              <a:rPr lang="de-DE" sz="1000" kern="1200" dirty="0" err="1">
+                <a:solidFill>
+                  <a:schemeClr val="tx1"/>
+                </a:solidFill>
+                <a:latin typeface="+mn-lt"/>
+                <a:ea typeface="+mn-ea"/>
+                <a:cs typeface="+mn-cs"/>
+              </a:rPr>
+              <a:t>that</a:t>
+            </a:r>
+            <a:r>
+              <a:rPr lang="de-DE" sz="1000" kern="1200" dirty="0">
+                <a:solidFill>
+                  <a:schemeClr val="tx1"/>
+                </a:solidFill>
+                <a:latin typeface="+mn-lt"/>
+                <a:ea typeface="+mn-ea"/>
+                <a:cs typeface="+mn-cs"/>
+              </a:rPr>
+              <a:t>  ( </a:t>
+            </a:r>
+            <a:r>
+              <a:rPr lang="de-DE" sz="1000" kern="1200" dirty="0" err="1">
+                <a:solidFill>
+                  <a:schemeClr val="tx1"/>
+                </a:solidFill>
+                <a:latin typeface="+mn-lt"/>
+                <a:ea typeface="+mn-ea"/>
+                <a:cs typeface="+mn-cs"/>
+              </a:rPr>
+              <a:t>id</a:t>
+            </a:r>
+            <a:r>
+              <a:rPr lang="de-DE" sz="1000" kern="1200" dirty="0">
+                <a:solidFill>
+                  <a:schemeClr val="tx1"/>
+                </a:solidFill>
+                <a:latin typeface="+mn-lt"/>
+                <a:ea typeface="+mn-ea"/>
+                <a:cs typeface="+mn-cs"/>
+              </a:rPr>
+              <a:t>, </a:t>
+            </a:r>
+            <a:r>
+              <a:rPr lang="de-DE" sz="1000" kern="1200" dirty="0" err="1">
+                <a:solidFill>
+                  <a:schemeClr val="tx1"/>
+                </a:solidFill>
+                <a:latin typeface="+mn-lt"/>
+                <a:ea typeface="+mn-ea"/>
+                <a:cs typeface="+mn-cs"/>
+              </a:rPr>
+              <a:t>stdout</a:t>
+            </a:r>
+            <a:r>
+              <a:rPr lang="de-DE" sz="1000" kern="1200" dirty="0">
+                <a:solidFill>
+                  <a:schemeClr val="tx1"/>
+                </a:solidFill>
+                <a:latin typeface="+mn-lt"/>
+                <a:ea typeface="+mn-ea"/>
+                <a:cs typeface="+mn-cs"/>
+              </a:rPr>
+              <a:t>, </a:t>
+            </a:r>
+            <a:r>
+              <a:rPr lang="de-DE" sz="1000" kern="1200" dirty="0" err="1">
+                <a:solidFill>
+                  <a:schemeClr val="tx1"/>
+                </a:solidFill>
+                <a:latin typeface="+mn-lt"/>
+                <a:ea typeface="+mn-ea"/>
+                <a:cs typeface="+mn-cs"/>
+              </a:rPr>
+              <a:t>stderr</a:t>
+            </a:r>
+            <a:r>
+              <a:rPr lang="de-DE" sz="1000" dirty="0"/>
+              <a:t>)</a:t>
+            </a:r>
+          </a:p>
+          <a:p>
+            <a:pPr marL="742950" lvl="1" indent="-285750">
+              <a:spcAft>
+                <a:spcPts val="600"/>
+              </a:spcAft>
+              <a:buClr>
+                <a:schemeClr val="tx2"/>
+              </a:buClr>
+              <a:buFont typeface="Arial" panose="020B0604020202020204" pitchFamily="34" charset="0"/>
+              <a:buChar char="•"/>
+            </a:pPr>
+            <a:r>
+              <a:rPr lang="de-DE" sz="1000" kern="1200" dirty="0">
+                <a:solidFill>
+                  <a:schemeClr val="tx1"/>
+                </a:solidFill>
+                <a:latin typeface="+mn-lt"/>
+                <a:ea typeface="+mn-ea"/>
+                <a:cs typeface="+mn-cs"/>
+              </a:rPr>
+              <a:t>Dump </a:t>
+            </a:r>
+            <a:r>
+              <a:rPr lang="de-DE" sz="1000" kern="1200" dirty="0" err="1">
+                <a:solidFill>
+                  <a:schemeClr val="tx1"/>
+                </a:solidFill>
+                <a:latin typeface="+mn-lt"/>
+                <a:ea typeface="+mn-ea"/>
+                <a:cs typeface="+mn-cs"/>
+              </a:rPr>
+              <a:t>into</a:t>
+            </a:r>
+            <a:r>
+              <a:rPr lang="de-DE" sz="1000" kern="1200" dirty="0">
+                <a:solidFill>
+                  <a:schemeClr val="tx1"/>
+                </a:solidFill>
+                <a:latin typeface="+mn-lt"/>
+                <a:ea typeface="+mn-ea"/>
+                <a:cs typeface="+mn-cs"/>
+              </a:rPr>
+              <a:t> </a:t>
+            </a:r>
+            <a:r>
+              <a:rPr lang="de-DE" sz="1000" kern="1200" dirty="0" err="1">
+                <a:solidFill>
+                  <a:schemeClr val="tx1"/>
+                </a:solidFill>
+                <a:latin typeface="+mn-lt"/>
+                <a:ea typeface="+mn-ea"/>
+                <a:cs typeface="+mn-cs"/>
+              </a:rPr>
+              <a:t>new</a:t>
+            </a:r>
+            <a:r>
+              <a:rPr lang="de-DE" sz="1000" kern="1200" dirty="0">
+                <a:solidFill>
+                  <a:schemeClr val="tx1"/>
+                </a:solidFill>
+                <a:latin typeface="+mn-lt"/>
+                <a:ea typeface="+mn-ea"/>
+                <a:cs typeface="+mn-cs"/>
+              </a:rPr>
+              <a:t> </a:t>
+            </a:r>
+            <a:r>
+              <a:rPr lang="de-DE" sz="1000" kern="1200" dirty="0" err="1">
+                <a:solidFill>
+                  <a:schemeClr val="tx1"/>
+                </a:solidFill>
+                <a:latin typeface="+mn-lt"/>
+                <a:ea typeface="+mn-ea"/>
+                <a:cs typeface="+mn-cs"/>
+              </a:rPr>
+              <a:t>file</a:t>
+            </a:r>
+            <a:r>
+              <a:rPr lang="de-DE" sz="1000" kern="1200" dirty="0">
+                <a:solidFill>
+                  <a:schemeClr val="tx1"/>
+                </a:solidFill>
+                <a:latin typeface="+mn-lt"/>
+                <a:ea typeface="+mn-ea"/>
+                <a:cs typeface="+mn-cs"/>
+              </a:rPr>
+              <a:t> </a:t>
+            </a:r>
+            <a:r>
+              <a:rPr lang="de-DE" sz="1000" kern="1200" dirty="0" err="1">
+                <a:solidFill>
+                  <a:schemeClr val="tx1"/>
+                </a:solidFill>
+                <a:latin typeface="+mn-lt"/>
+                <a:ea typeface="+mn-ea"/>
+                <a:cs typeface="+mn-cs"/>
+              </a:rPr>
+              <a:t>with</a:t>
+            </a:r>
+            <a:r>
+              <a:rPr lang="de-DE" sz="1000" kern="1200" dirty="0">
+                <a:solidFill>
+                  <a:schemeClr val="tx1"/>
+                </a:solidFill>
+                <a:latin typeface="+mn-lt"/>
+                <a:ea typeface="+mn-ea"/>
+                <a:cs typeface="+mn-cs"/>
+              </a:rPr>
+              <a:t> </a:t>
+            </a:r>
+            <a:r>
+              <a:rPr lang="de-DE" sz="1000" kern="1200" dirty="0" err="1">
+                <a:solidFill>
+                  <a:schemeClr val="tx1"/>
+                </a:solidFill>
+                <a:latin typeface="+mn-lt"/>
+                <a:ea typeface="+mn-ea"/>
+                <a:cs typeface="+mn-cs"/>
+              </a:rPr>
+              <a:t>filename</a:t>
+            </a:r>
+            <a:r>
+              <a:rPr lang="de-DE" sz="1000" kern="1200" dirty="0">
+                <a:solidFill>
+                  <a:schemeClr val="tx1"/>
+                </a:solidFill>
+                <a:latin typeface="+mn-lt"/>
+                <a:ea typeface="+mn-ea"/>
+                <a:cs typeface="+mn-cs"/>
+              </a:rPr>
+              <a:t> + </a:t>
+            </a:r>
+            <a:r>
+              <a:rPr lang="de-DE" sz="1000" kern="1200" dirty="0" err="1">
+                <a:solidFill>
+                  <a:schemeClr val="tx1"/>
+                </a:solidFill>
+                <a:latin typeface="+mn-lt"/>
+                <a:ea typeface="+mn-ea"/>
+                <a:cs typeface="+mn-cs"/>
+              </a:rPr>
+              <a:t>cropped</a:t>
+            </a:r>
+            <a:endParaRPr lang="de-DE" sz="1000" kern="1200" dirty="0">
+              <a:solidFill>
+                <a:schemeClr val="tx1"/>
+              </a:solidFill>
+              <a:latin typeface="+mn-lt"/>
+              <a:ea typeface="+mn-ea"/>
+              <a:cs typeface="+mn-cs"/>
+            </a:endParaRPr>
+          </a:p>
+          <a:p>
+            <a:pPr marL="742950" lvl="1" indent="-285750">
+              <a:spcAft>
+                <a:spcPts val="600"/>
+              </a:spcAft>
+              <a:buClr>
+                <a:schemeClr val="tx2"/>
+              </a:buClr>
+              <a:buFont typeface="Arial" panose="020B0604020202020204" pitchFamily="34" charset="0"/>
+              <a:buChar char="•"/>
+            </a:pPr>
+            <a:r>
+              <a:rPr lang="de-DE" sz="1000" kern="1200" dirty="0" err="1">
+                <a:solidFill>
+                  <a:schemeClr val="tx1"/>
+                </a:solidFill>
+                <a:latin typeface="+mn-lt"/>
+                <a:ea typeface="+mn-ea"/>
+                <a:cs typeface="+mn-cs"/>
+              </a:rPr>
+              <a:t>Manually</a:t>
+            </a:r>
+            <a:r>
+              <a:rPr lang="de-DE" sz="1000" kern="1200" dirty="0">
+                <a:solidFill>
+                  <a:schemeClr val="tx1"/>
+                </a:solidFill>
+                <a:latin typeface="+mn-lt"/>
+                <a:ea typeface="+mn-ea"/>
+                <a:cs typeface="+mn-cs"/>
+              </a:rPr>
+              <a:t> </a:t>
+            </a:r>
+            <a:r>
+              <a:rPr lang="de-DE" sz="1000" kern="1200" dirty="0" err="1">
+                <a:solidFill>
+                  <a:schemeClr val="tx1"/>
+                </a:solidFill>
+                <a:latin typeface="+mn-lt"/>
+                <a:ea typeface="+mn-ea"/>
+                <a:cs typeface="+mn-cs"/>
+              </a:rPr>
+              <a:t>downloaded</a:t>
+            </a:r>
+            <a:r>
+              <a:rPr lang="de-DE" sz="1000" kern="1200" dirty="0">
+                <a:solidFill>
+                  <a:schemeClr val="tx1"/>
+                </a:solidFill>
+                <a:latin typeface="+mn-lt"/>
+                <a:ea typeface="+mn-ea"/>
+                <a:cs typeface="+mn-cs"/>
+              </a:rPr>
+              <a:t> </a:t>
+            </a:r>
+            <a:r>
+              <a:rPr lang="de-DE" sz="1000" kern="1200" dirty="0" err="1">
+                <a:solidFill>
+                  <a:schemeClr val="tx1"/>
+                </a:solidFill>
+                <a:latin typeface="+mn-lt"/>
+                <a:ea typeface="+mn-ea"/>
+                <a:cs typeface="+mn-cs"/>
+              </a:rPr>
+              <a:t>test</a:t>
+            </a:r>
+            <a:r>
+              <a:rPr lang="de-DE" sz="1000" kern="1200" dirty="0">
+                <a:solidFill>
+                  <a:schemeClr val="tx1"/>
+                </a:solidFill>
+                <a:latin typeface="+mn-lt"/>
+                <a:ea typeface="+mn-ea"/>
+                <a:cs typeface="+mn-cs"/>
+              </a:rPr>
+              <a:t> </a:t>
+            </a:r>
+            <a:r>
+              <a:rPr lang="de-DE" sz="1000" kern="1200" dirty="0" err="1">
+                <a:solidFill>
+                  <a:schemeClr val="tx1"/>
+                </a:solidFill>
+                <a:latin typeface="+mn-lt"/>
+                <a:ea typeface="+mn-ea"/>
+                <a:cs typeface="+mn-cs"/>
+              </a:rPr>
+              <a:t>batch</a:t>
+            </a:r>
+            <a:r>
+              <a:rPr lang="de-DE" sz="1000" kern="1200" dirty="0">
+                <a:solidFill>
+                  <a:schemeClr val="tx1"/>
+                </a:solidFill>
+                <a:latin typeface="+mn-lt"/>
+                <a:ea typeface="+mn-ea"/>
+                <a:cs typeface="+mn-cs"/>
+              </a:rPr>
+              <a:t> ( ~15 </a:t>
+            </a:r>
+            <a:r>
+              <a:rPr lang="de-DE" sz="1000" kern="1200" dirty="0" err="1">
+                <a:solidFill>
+                  <a:schemeClr val="tx1"/>
+                </a:solidFill>
+                <a:latin typeface="+mn-lt"/>
+                <a:ea typeface="+mn-ea"/>
+                <a:cs typeface="+mn-cs"/>
+              </a:rPr>
+              <a:t>files</a:t>
+            </a:r>
+            <a:r>
+              <a:rPr lang="de-DE" sz="1000" kern="1200" dirty="0">
+                <a:solidFill>
+                  <a:schemeClr val="tx1"/>
+                </a:solidFill>
+                <a:latin typeface="+mn-lt"/>
+                <a:ea typeface="+mn-ea"/>
+                <a:cs typeface="+mn-cs"/>
+              </a:rPr>
+              <a:t>)</a:t>
+            </a:r>
+          </a:p>
+          <a:p>
+            <a:pPr marL="742950" lvl="1" indent="-285750">
+              <a:spcAft>
+                <a:spcPts val="600"/>
+              </a:spcAft>
+              <a:buClr>
+                <a:schemeClr val="tx2"/>
+              </a:buClr>
+              <a:buFont typeface="Arial" panose="020B0604020202020204" pitchFamily="34" charset="0"/>
+              <a:buChar char="•"/>
+            </a:pPr>
+            <a:r>
+              <a:rPr lang="de-DE" sz="1000" kern="1200" dirty="0" err="1">
+                <a:solidFill>
+                  <a:schemeClr val="tx1"/>
+                </a:solidFill>
+                <a:latin typeface="+mn-lt"/>
+                <a:ea typeface="+mn-ea"/>
+                <a:cs typeface="+mn-cs"/>
+              </a:rPr>
+              <a:t>Occured</a:t>
+            </a:r>
+            <a:r>
+              <a:rPr lang="de-DE" sz="1000" kern="1200" dirty="0">
+                <a:solidFill>
+                  <a:schemeClr val="tx1"/>
+                </a:solidFill>
+                <a:latin typeface="+mn-lt"/>
+                <a:ea typeface="+mn-ea"/>
+                <a:cs typeface="+mn-cs"/>
+              </a:rPr>
+              <a:t> </a:t>
+            </a:r>
+            <a:r>
+              <a:rPr lang="de-DE" sz="1000" kern="1200" dirty="0" err="1">
+                <a:solidFill>
+                  <a:schemeClr val="tx1"/>
+                </a:solidFill>
+                <a:latin typeface="+mn-lt"/>
+                <a:ea typeface="+mn-ea"/>
+                <a:cs typeface="+mn-cs"/>
+              </a:rPr>
+              <a:t>Issues</a:t>
+            </a:r>
+            <a:r>
+              <a:rPr lang="de-DE" sz="1000" dirty="0"/>
+              <a:t>: </a:t>
+            </a:r>
+            <a:r>
+              <a:rPr lang="de-DE" sz="1000" dirty="0" err="1"/>
+              <a:t>pretty</a:t>
+            </a:r>
+            <a:r>
+              <a:rPr lang="de-DE" sz="1000" dirty="0"/>
+              <a:t> slow </a:t>
+            </a:r>
+          </a:p>
+          <a:p>
+            <a:pPr marL="342900" indent="-342900">
+              <a:spcAft>
+                <a:spcPts val="600"/>
+              </a:spcAft>
+              <a:buClr>
+                <a:schemeClr val="tx2"/>
+              </a:buClr>
+              <a:buFont typeface="+mj-lt"/>
+              <a:buAutoNum type="arabicPeriod"/>
+            </a:pPr>
+            <a:r>
+              <a:rPr lang="de-DE" sz="1000" dirty="0" err="1"/>
+              <a:t>Script</a:t>
+            </a:r>
+            <a:r>
+              <a:rPr lang="de-DE" sz="1000" dirty="0"/>
+              <a:t> </a:t>
+            </a:r>
+            <a:r>
+              <a:rPr lang="de-DE" sz="1000" dirty="0" err="1"/>
+              <a:t>to</a:t>
+            </a:r>
+            <a:r>
+              <a:rPr lang="de-DE" sz="1000" dirty="0"/>
+              <a:t> </a:t>
+            </a:r>
+            <a:r>
+              <a:rPr lang="de-DE" sz="1000" dirty="0" err="1"/>
+              <a:t>label</a:t>
+            </a:r>
+            <a:r>
+              <a:rPr lang="de-DE" sz="1000" dirty="0"/>
+              <a:t> </a:t>
+            </a:r>
+            <a:r>
+              <a:rPr lang="de-DE" sz="1000" dirty="0" err="1"/>
+              <a:t>known</a:t>
+            </a:r>
+            <a:r>
+              <a:rPr lang="de-DE" sz="1000" dirty="0"/>
+              <a:t> </a:t>
+            </a:r>
+            <a:r>
+              <a:rPr lang="de-DE" sz="1000" dirty="0" err="1"/>
+              <a:t>errors</a:t>
+            </a:r>
+            <a:r>
+              <a:rPr lang="de-DE" sz="1000" dirty="0"/>
+              <a:t> in </a:t>
+            </a:r>
+            <a:r>
+              <a:rPr lang="de-DE" sz="1000" dirty="0" err="1"/>
+              <a:t>cropped</a:t>
+            </a:r>
+            <a:r>
+              <a:rPr lang="de-DE" sz="1000" dirty="0"/>
+              <a:t> </a:t>
+            </a:r>
+            <a:r>
+              <a:rPr lang="de-DE" sz="1000" dirty="0" err="1"/>
+              <a:t>files</a:t>
+            </a:r>
+            <a:r>
+              <a:rPr lang="de-DE" sz="1000" dirty="0"/>
+              <a:t> </a:t>
+            </a:r>
+            <a:r>
+              <a:rPr lang="de-DE" sz="1000" dirty="0" err="1"/>
+              <a:t>according</a:t>
+            </a:r>
+            <a:r>
+              <a:rPr lang="de-DE" sz="1000" dirty="0"/>
+              <a:t> </a:t>
+            </a:r>
+            <a:r>
+              <a:rPr lang="de-DE" sz="1000" dirty="0" err="1"/>
+              <a:t>to</a:t>
+            </a:r>
+            <a:r>
+              <a:rPr lang="de-DE" sz="1000" dirty="0"/>
+              <a:t> RegEx-pattern</a:t>
+            </a:r>
+          </a:p>
+          <a:p>
+            <a:pPr marL="742950" lvl="1" indent="-285750">
+              <a:spcAft>
+                <a:spcPts val="600"/>
+              </a:spcAft>
+              <a:buClr>
+                <a:schemeClr val="tx2"/>
+              </a:buClr>
+              <a:buFont typeface="Arial" panose="020B0604020202020204" pitchFamily="34" charset="0"/>
+              <a:buChar char="•"/>
+            </a:pPr>
+            <a:r>
+              <a:rPr lang="de-DE" sz="1000" kern="1200" dirty="0">
+                <a:solidFill>
+                  <a:schemeClr val="tx1"/>
+                </a:solidFill>
+                <a:latin typeface="+mn-lt"/>
+                <a:ea typeface="+mn-ea"/>
+                <a:cs typeface="+mn-cs"/>
+              </a:rPr>
+              <a:t>Figure out structure of </a:t>
+            </a:r>
+            <a:r>
+              <a:rPr lang="de-DE" sz="1000" kern="1200" dirty="0" err="1">
+                <a:solidFill>
+                  <a:schemeClr val="tx1"/>
+                </a:solidFill>
+                <a:latin typeface="+mn-lt"/>
+                <a:ea typeface="+mn-ea"/>
+                <a:cs typeface="+mn-cs"/>
+              </a:rPr>
+              <a:t>regex</a:t>
+            </a:r>
+            <a:endParaRPr lang="de-DE" sz="1000" kern="1200" dirty="0">
+              <a:solidFill>
+                <a:schemeClr val="tx1"/>
+              </a:solidFill>
+              <a:latin typeface="+mn-lt"/>
+              <a:ea typeface="+mn-ea"/>
+              <a:cs typeface="+mn-cs"/>
+            </a:endParaRPr>
+          </a:p>
+          <a:p>
+            <a:pPr marL="742950" lvl="1" indent="-285750">
+              <a:spcAft>
+                <a:spcPts val="600"/>
+              </a:spcAft>
+              <a:buClr>
+                <a:schemeClr val="tx2"/>
+              </a:buClr>
+              <a:buFont typeface="Arial" panose="020B0604020202020204" pitchFamily="34" charset="0"/>
+              <a:buChar char="•"/>
+            </a:pPr>
+            <a:r>
+              <a:rPr lang="de-DE" sz="1000" kern="1200" dirty="0" err="1">
+                <a:solidFill>
+                  <a:schemeClr val="tx1"/>
+                </a:solidFill>
+                <a:latin typeface="+mn-lt"/>
+                <a:ea typeface="+mn-ea"/>
+                <a:cs typeface="+mn-cs"/>
+              </a:rPr>
+              <a:t>Some</a:t>
+            </a:r>
+            <a:r>
+              <a:rPr lang="de-DE" sz="1000" kern="1200" dirty="0">
+                <a:solidFill>
+                  <a:schemeClr val="tx1"/>
+                </a:solidFill>
+                <a:latin typeface="+mn-lt"/>
+                <a:ea typeface="+mn-ea"/>
+                <a:cs typeface="+mn-cs"/>
+              </a:rPr>
+              <a:t> </a:t>
+            </a:r>
+            <a:r>
+              <a:rPr lang="de-DE" sz="1000" kern="1200" dirty="0" err="1">
+                <a:solidFill>
+                  <a:schemeClr val="tx1"/>
+                </a:solidFill>
+                <a:latin typeface="+mn-lt"/>
+                <a:ea typeface="+mn-ea"/>
+                <a:cs typeface="+mn-cs"/>
+              </a:rPr>
+              <a:t>pattern</a:t>
+            </a:r>
+            <a:r>
+              <a:rPr lang="de-DE" sz="1000" kern="1200" dirty="0">
+                <a:solidFill>
+                  <a:schemeClr val="tx1"/>
+                </a:solidFill>
+                <a:latin typeface="+mn-lt"/>
+                <a:ea typeface="+mn-ea"/>
+                <a:cs typeface="+mn-cs"/>
+              </a:rPr>
+              <a:t> </a:t>
+            </a:r>
+            <a:r>
+              <a:rPr lang="de-DE" sz="1000" kern="1200" dirty="0" err="1">
+                <a:solidFill>
+                  <a:schemeClr val="tx1"/>
+                </a:solidFill>
+                <a:latin typeface="+mn-lt"/>
+                <a:ea typeface="+mn-ea"/>
+                <a:cs typeface="+mn-cs"/>
+              </a:rPr>
+              <a:t>are</a:t>
+            </a:r>
+            <a:r>
+              <a:rPr lang="de-DE" sz="1000" kern="1200" dirty="0">
+                <a:solidFill>
+                  <a:schemeClr val="tx1"/>
+                </a:solidFill>
+                <a:latin typeface="+mn-lt"/>
+                <a:ea typeface="+mn-ea"/>
+                <a:cs typeface="+mn-cs"/>
+              </a:rPr>
+              <a:t> </a:t>
+            </a:r>
+            <a:r>
+              <a:rPr lang="de-DE" sz="1000" kern="1200" dirty="0" err="1">
+                <a:solidFill>
+                  <a:schemeClr val="tx1"/>
+                </a:solidFill>
+                <a:latin typeface="+mn-lt"/>
+                <a:ea typeface="+mn-ea"/>
+                <a:cs typeface="+mn-cs"/>
+              </a:rPr>
+              <a:t>dicts</a:t>
+            </a:r>
+            <a:r>
+              <a:rPr lang="de-DE" sz="1000" kern="1200" dirty="0">
+                <a:solidFill>
+                  <a:schemeClr val="tx1"/>
+                </a:solidFill>
+                <a:latin typeface="+mn-lt"/>
+                <a:ea typeface="+mn-ea"/>
+                <a:cs typeface="+mn-cs"/>
+              </a:rPr>
+              <a:t> </a:t>
+            </a:r>
+            <a:r>
+              <a:rPr lang="de-DE" sz="1000" kern="1200" dirty="0" err="1">
+                <a:solidFill>
+                  <a:schemeClr val="tx1"/>
+                </a:solidFill>
+                <a:latin typeface="+mn-lt"/>
+                <a:ea typeface="+mn-ea"/>
+                <a:cs typeface="+mn-cs"/>
+              </a:rPr>
+              <a:t>with</a:t>
+            </a:r>
+            <a:r>
+              <a:rPr lang="de-DE" sz="1000" kern="1200" dirty="0">
+                <a:solidFill>
+                  <a:schemeClr val="tx1"/>
+                </a:solidFill>
+                <a:latin typeface="+mn-lt"/>
+                <a:ea typeface="+mn-ea"/>
+                <a:cs typeface="+mn-cs"/>
+              </a:rPr>
+              <a:t> </a:t>
+            </a:r>
+            <a:r>
+              <a:rPr lang="de-DE" sz="1000" kern="1200" dirty="0" err="1">
+                <a:solidFill>
+                  <a:schemeClr val="tx1"/>
+                </a:solidFill>
+                <a:latin typeface="+mn-lt"/>
+                <a:ea typeface="+mn-ea"/>
+                <a:cs typeface="+mn-cs"/>
+              </a:rPr>
+              <a:t>subtypes</a:t>
+            </a:r>
+            <a:r>
+              <a:rPr lang="de-DE" sz="1000" kern="1200" dirty="0">
+                <a:solidFill>
+                  <a:schemeClr val="tx1"/>
+                </a:solidFill>
+                <a:latin typeface="+mn-lt"/>
+                <a:ea typeface="+mn-ea"/>
+                <a:cs typeface="+mn-cs"/>
+              </a:rPr>
+              <a:t>, </a:t>
+            </a:r>
+            <a:r>
+              <a:rPr lang="de-DE" sz="1000" kern="1200" dirty="0" err="1">
+                <a:solidFill>
+                  <a:schemeClr val="tx1"/>
+                </a:solidFill>
+                <a:latin typeface="+mn-lt"/>
+                <a:ea typeface="+mn-ea"/>
+                <a:cs typeface="+mn-cs"/>
+              </a:rPr>
+              <a:t>only</a:t>
+            </a:r>
+            <a:r>
+              <a:rPr lang="de-DE" sz="1000" kern="1200" dirty="0">
+                <a:solidFill>
+                  <a:schemeClr val="tx1"/>
+                </a:solidFill>
+                <a:latin typeface="+mn-lt"/>
+                <a:ea typeface="+mn-ea"/>
+                <a:cs typeface="+mn-cs"/>
+              </a:rPr>
+              <a:t> </a:t>
+            </a:r>
+            <a:r>
+              <a:rPr lang="de-DE" sz="1000" kern="1200" dirty="0" err="1">
+                <a:solidFill>
+                  <a:schemeClr val="tx1"/>
+                </a:solidFill>
+                <a:latin typeface="+mn-lt"/>
+                <a:ea typeface="+mn-ea"/>
+                <a:cs typeface="+mn-cs"/>
+              </a:rPr>
+              <a:t>dict</a:t>
+            </a:r>
+            <a:r>
+              <a:rPr lang="de-DE" sz="1000" kern="1200" dirty="0">
+                <a:solidFill>
+                  <a:schemeClr val="tx1"/>
+                </a:solidFill>
+                <a:latin typeface="+mn-lt"/>
+                <a:ea typeface="+mn-ea"/>
+                <a:cs typeface="+mn-cs"/>
+              </a:rPr>
+              <a:t> </a:t>
+            </a:r>
+            <a:r>
+              <a:rPr lang="de-DE" sz="1000" kern="1200" dirty="0" err="1">
+                <a:solidFill>
+                  <a:schemeClr val="tx1"/>
+                </a:solidFill>
+                <a:latin typeface="+mn-lt"/>
+                <a:ea typeface="+mn-ea"/>
+                <a:cs typeface="+mn-cs"/>
+              </a:rPr>
+              <a:t>lists</a:t>
+            </a:r>
+            <a:r>
+              <a:rPr lang="de-DE" sz="1000" kern="1200" dirty="0">
+                <a:solidFill>
+                  <a:schemeClr val="tx1"/>
+                </a:solidFill>
+                <a:latin typeface="+mn-lt"/>
+                <a:ea typeface="+mn-ea"/>
+                <a:cs typeface="+mn-cs"/>
+              </a:rPr>
+              <a:t> etc. – Problems </a:t>
+            </a:r>
+            <a:r>
+              <a:rPr lang="de-DE" sz="1000" kern="1200" dirty="0" err="1">
+                <a:solidFill>
+                  <a:schemeClr val="tx1"/>
+                </a:solidFill>
+                <a:latin typeface="+mn-lt"/>
+                <a:ea typeface="+mn-ea"/>
+                <a:cs typeface="+mn-cs"/>
+              </a:rPr>
+              <a:t>making</a:t>
+            </a:r>
+            <a:r>
+              <a:rPr lang="de-DE" sz="1000" kern="1200" dirty="0">
+                <a:solidFill>
+                  <a:schemeClr val="tx1"/>
+                </a:solidFill>
+                <a:latin typeface="+mn-lt"/>
+                <a:ea typeface="+mn-ea"/>
+                <a:cs typeface="+mn-cs"/>
+              </a:rPr>
+              <a:t> code </a:t>
+            </a:r>
+            <a:r>
+              <a:rPr lang="de-DE" sz="1000" kern="1200" dirty="0" err="1">
+                <a:solidFill>
+                  <a:schemeClr val="tx1"/>
+                </a:solidFill>
+                <a:latin typeface="+mn-lt"/>
+                <a:ea typeface="+mn-ea"/>
+                <a:cs typeface="+mn-cs"/>
+              </a:rPr>
+              <a:t>to</a:t>
+            </a:r>
+            <a:r>
+              <a:rPr lang="de-DE" sz="1000" kern="1200" dirty="0">
+                <a:solidFill>
+                  <a:schemeClr val="tx1"/>
+                </a:solidFill>
+                <a:latin typeface="+mn-lt"/>
+                <a:ea typeface="+mn-ea"/>
+                <a:cs typeface="+mn-cs"/>
+              </a:rPr>
+              <a:t> </a:t>
+            </a:r>
+            <a:r>
+              <a:rPr lang="de-DE" sz="1000" kern="1200" dirty="0" err="1">
+                <a:solidFill>
+                  <a:schemeClr val="tx1"/>
+                </a:solidFill>
+                <a:latin typeface="+mn-lt"/>
+                <a:ea typeface="+mn-ea"/>
+                <a:cs typeface="+mn-cs"/>
+              </a:rPr>
+              <a:t>work</a:t>
+            </a:r>
+            <a:r>
+              <a:rPr lang="de-DE" sz="1000" kern="1200" dirty="0">
+                <a:solidFill>
+                  <a:schemeClr val="tx1"/>
+                </a:solidFill>
+                <a:latin typeface="+mn-lt"/>
+                <a:ea typeface="+mn-ea"/>
+                <a:cs typeface="+mn-cs"/>
+              </a:rPr>
+              <a:t> </a:t>
+            </a:r>
+            <a:r>
+              <a:rPr lang="de-DE" sz="1000" kern="1200" dirty="0" err="1">
+                <a:solidFill>
+                  <a:schemeClr val="tx1"/>
+                </a:solidFill>
+                <a:latin typeface="+mn-lt"/>
+                <a:ea typeface="+mn-ea"/>
+                <a:cs typeface="+mn-cs"/>
+              </a:rPr>
+              <a:t>with</a:t>
+            </a:r>
+            <a:r>
+              <a:rPr lang="de-DE" sz="1000" kern="1200" dirty="0">
+                <a:solidFill>
+                  <a:schemeClr val="tx1"/>
+                </a:solidFill>
+                <a:latin typeface="+mn-lt"/>
+                <a:ea typeface="+mn-ea"/>
+                <a:cs typeface="+mn-cs"/>
+              </a:rPr>
+              <a:t> all of </a:t>
+            </a:r>
+            <a:r>
+              <a:rPr lang="de-DE" sz="1000" kern="1200" dirty="0" err="1">
+                <a:solidFill>
+                  <a:schemeClr val="tx1"/>
+                </a:solidFill>
+                <a:latin typeface="+mn-lt"/>
+                <a:ea typeface="+mn-ea"/>
+                <a:cs typeface="+mn-cs"/>
+              </a:rPr>
+              <a:t>those</a:t>
+            </a:r>
+            <a:r>
+              <a:rPr lang="de-DE" sz="1000" kern="1200" dirty="0">
+                <a:solidFill>
+                  <a:schemeClr val="tx1"/>
+                </a:solidFill>
+                <a:latin typeface="+mn-lt"/>
+                <a:ea typeface="+mn-ea"/>
+                <a:cs typeface="+mn-cs"/>
+              </a:rPr>
+              <a:t> </a:t>
+            </a:r>
+          </a:p>
+          <a:p>
+            <a:pPr marL="742950" lvl="1" indent="-285750">
+              <a:spcAft>
+                <a:spcPts val="600"/>
+              </a:spcAft>
+              <a:buClr>
+                <a:schemeClr val="tx2"/>
+              </a:buClr>
+              <a:buFont typeface="Arial" panose="020B0604020202020204" pitchFamily="34" charset="0"/>
+              <a:buChar char="•"/>
+            </a:pPr>
+            <a:r>
+              <a:rPr lang="de-DE" sz="1000" dirty="0" err="1"/>
+              <a:t>figure</a:t>
+            </a:r>
+            <a:r>
+              <a:rPr lang="de-DE" sz="1000" dirty="0"/>
+              <a:t> out </a:t>
+            </a:r>
+            <a:r>
+              <a:rPr lang="de-DE" sz="1000" dirty="0" err="1"/>
+              <a:t>for</a:t>
+            </a:r>
+            <a:r>
+              <a:rPr lang="de-DE" sz="1000" dirty="0"/>
+              <a:t> INFRA_PATTERN</a:t>
+            </a:r>
+          </a:p>
+          <a:p>
+            <a:pPr marL="742950" lvl="1" indent="-285750">
+              <a:spcAft>
+                <a:spcPts val="600"/>
+              </a:spcAft>
+              <a:buClr>
+                <a:schemeClr val="tx2"/>
+              </a:buClr>
+              <a:buFont typeface="Arial" panose="020B0604020202020204" pitchFamily="34" charset="0"/>
+              <a:buChar char="•"/>
+            </a:pPr>
+            <a:r>
+              <a:rPr lang="de-DE" sz="1000" kern="1200" dirty="0">
+                <a:solidFill>
+                  <a:schemeClr val="tx1"/>
+                </a:solidFill>
+                <a:latin typeface="+mn-lt"/>
+                <a:ea typeface="+mn-ea"/>
+                <a:cs typeface="+mn-cs"/>
+              </a:rPr>
+              <a:t>Figure out </a:t>
+            </a:r>
+            <a:r>
+              <a:rPr lang="de-DE" sz="1000" kern="1200" dirty="0" err="1">
+                <a:solidFill>
+                  <a:schemeClr val="tx1"/>
+                </a:solidFill>
+                <a:latin typeface="+mn-lt"/>
+                <a:ea typeface="+mn-ea"/>
+                <a:cs typeface="+mn-cs"/>
+              </a:rPr>
+              <a:t>for</a:t>
+            </a:r>
+            <a:r>
+              <a:rPr lang="de-DE" sz="1000" kern="1200" dirty="0">
+                <a:solidFill>
+                  <a:schemeClr val="tx1"/>
+                </a:solidFill>
+                <a:latin typeface="+mn-lt"/>
+                <a:ea typeface="+mn-ea"/>
+                <a:cs typeface="+mn-cs"/>
+              </a:rPr>
+              <a:t> BUILD_PATTERN</a:t>
+            </a:r>
+          </a:p>
+          <a:p>
+            <a:pPr marL="742950" lvl="1" indent="-285750">
+              <a:spcAft>
+                <a:spcPts val="600"/>
+              </a:spcAft>
+              <a:buClr>
+                <a:schemeClr val="tx2"/>
+              </a:buClr>
+              <a:buFont typeface="Arial" panose="020B0604020202020204" pitchFamily="34" charset="0"/>
+              <a:buChar char="•"/>
+            </a:pPr>
+            <a:r>
+              <a:rPr lang="de-DE" sz="1000" dirty="0"/>
+              <a:t>Combine</a:t>
+            </a:r>
+          </a:p>
+          <a:p>
+            <a:pPr marL="742950" lvl="1" indent="-285750">
+              <a:spcAft>
+                <a:spcPts val="600"/>
+              </a:spcAft>
+              <a:buClr>
+                <a:schemeClr val="tx2"/>
+              </a:buClr>
+              <a:buFont typeface="Arial" panose="020B0604020202020204" pitchFamily="34" charset="0"/>
+              <a:buChar char="•"/>
+            </a:pPr>
+            <a:r>
+              <a:rPr lang="de-DE" sz="1000" dirty="0" err="1"/>
+              <a:t>Some</a:t>
+            </a:r>
+            <a:r>
+              <a:rPr lang="de-DE" sz="1000" dirty="0"/>
+              <a:t> </a:t>
+            </a:r>
+            <a:r>
+              <a:rPr lang="de-DE" sz="1000" dirty="0" err="1"/>
+              <a:t>subtypes</a:t>
+            </a:r>
+            <a:r>
+              <a:rPr lang="de-DE" sz="1000" dirty="0"/>
+              <a:t> </a:t>
+            </a:r>
+            <a:r>
+              <a:rPr lang="de-DE" sz="1000" dirty="0" err="1"/>
+              <a:t>are</a:t>
+            </a:r>
+            <a:r>
+              <a:rPr lang="de-DE" sz="1000" dirty="0"/>
+              <a:t> </a:t>
+            </a:r>
+            <a:r>
+              <a:rPr lang="de-DE" sz="1000" dirty="0" err="1"/>
+              <a:t>working</a:t>
+            </a:r>
+            <a:r>
+              <a:rPr lang="de-DE" sz="1000" dirty="0"/>
+              <a:t> </a:t>
+            </a:r>
+            <a:r>
+              <a:rPr lang="de-DE" sz="1000" dirty="0" err="1"/>
+              <a:t>now</a:t>
+            </a:r>
+            <a:r>
+              <a:rPr lang="de-DE" sz="1000" dirty="0"/>
+              <a:t>, </a:t>
+            </a:r>
+            <a:r>
+              <a:rPr lang="de-DE" sz="1000" dirty="0" err="1"/>
+              <a:t>others</a:t>
+            </a:r>
+            <a:r>
+              <a:rPr lang="de-DE" sz="1000" dirty="0"/>
+              <a:t> </a:t>
+            </a:r>
+            <a:r>
+              <a:rPr lang="de-DE" sz="1000" dirty="0" err="1"/>
+              <a:t>aren‘t</a:t>
+            </a:r>
+            <a:r>
+              <a:rPr lang="de-DE" sz="1000" dirty="0"/>
+              <a:t> -&gt; </a:t>
+            </a:r>
+            <a:r>
+              <a:rPr lang="de-DE" sz="1000" dirty="0" err="1"/>
+              <a:t>Issue</a:t>
+            </a:r>
+            <a:r>
+              <a:rPr lang="de-DE" sz="1000" dirty="0"/>
+              <a:t>, </a:t>
+            </a:r>
+            <a:r>
+              <a:rPr lang="de-DE" sz="1000" dirty="0" err="1"/>
+              <a:t>that</a:t>
+            </a:r>
+            <a:r>
+              <a:rPr lang="de-DE" sz="1000" dirty="0"/>
+              <a:t> </a:t>
+            </a:r>
+            <a:r>
+              <a:rPr lang="de-DE" sz="1000" dirty="0" err="1"/>
+              <a:t>took</a:t>
+            </a:r>
+            <a:r>
+              <a:rPr lang="de-DE" sz="1000" dirty="0"/>
+              <a:t> </a:t>
+            </a:r>
+            <a:r>
+              <a:rPr lang="de-DE" sz="1000" dirty="0" err="1"/>
+              <a:t>almost</a:t>
+            </a:r>
+            <a:r>
+              <a:rPr lang="de-DE" sz="1000" dirty="0"/>
+              <a:t> a </a:t>
+            </a:r>
+            <a:r>
+              <a:rPr lang="de-DE" sz="1000" dirty="0" err="1"/>
+              <a:t>whole</a:t>
+            </a:r>
+            <a:r>
+              <a:rPr lang="de-DE" sz="1000" dirty="0"/>
+              <a:t> </a:t>
+            </a:r>
+            <a:r>
+              <a:rPr lang="de-DE" sz="1000" dirty="0" err="1"/>
+              <a:t>day</a:t>
+            </a:r>
+            <a:r>
+              <a:rPr lang="de-DE" sz="1000" dirty="0"/>
+              <a:t> </a:t>
+            </a:r>
+            <a:r>
+              <a:rPr lang="de-DE" sz="1000" dirty="0" err="1"/>
+              <a:t>to</a:t>
+            </a:r>
+            <a:r>
+              <a:rPr lang="de-DE" sz="1000" dirty="0"/>
+              <a:t> </a:t>
+            </a:r>
+            <a:r>
+              <a:rPr lang="de-DE" sz="1000" dirty="0" err="1"/>
+              <a:t>figure</a:t>
+            </a:r>
+            <a:r>
+              <a:rPr lang="de-DE" sz="1000" dirty="0"/>
+              <a:t> out</a:t>
+            </a:r>
+          </a:p>
+          <a:p>
+            <a:pPr marL="228600" indent="-228600">
+              <a:spcAft>
+                <a:spcPts val="600"/>
+              </a:spcAft>
+              <a:buClr>
+                <a:schemeClr val="tx2"/>
+              </a:buClr>
+              <a:buFont typeface="+mj-lt"/>
+              <a:buAutoNum type="arabicPeriod"/>
+            </a:pPr>
+            <a:r>
+              <a:rPr lang="de-DE" sz="1000" dirty="0"/>
+              <a:t>Do </a:t>
+            </a:r>
+            <a:r>
+              <a:rPr lang="de-DE" sz="1000" dirty="0" err="1"/>
+              <a:t>more</a:t>
+            </a:r>
+            <a:r>
+              <a:rPr lang="de-DE" sz="1000" dirty="0"/>
+              <a:t> </a:t>
+            </a:r>
+            <a:r>
+              <a:rPr lang="de-DE" sz="1000" dirty="0" err="1"/>
+              <a:t>things</a:t>
+            </a:r>
+            <a:r>
+              <a:rPr lang="de-DE" sz="1000" dirty="0"/>
+              <a:t> (</a:t>
+            </a:r>
+            <a:r>
+              <a:rPr lang="de-DE" sz="1000" dirty="0" err="1"/>
+              <a:t>decide</a:t>
+            </a:r>
+            <a:r>
+              <a:rPr lang="de-DE" sz="1000" dirty="0"/>
+              <a:t> on </a:t>
+            </a:r>
+            <a:r>
+              <a:rPr lang="de-DE" sz="1000" dirty="0" err="1"/>
+              <a:t>labels</a:t>
+            </a:r>
+            <a:r>
+              <a:rPr lang="de-DE" sz="1000" dirty="0"/>
+              <a:t>)</a:t>
+            </a:r>
+          </a:p>
+          <a:p>
+            <a:pPr marL="228600" indent="-228600">
+              <a:spcAft>
+                <a:spcPts val="600"/>
+              </a:spcAft>
+              <a:buClr>
+                <a:schemeClr val="tx2"/>
+              </a:buClr>
+              <a:buFont typeface="+mj-lt"/>
+              <a:buAutoNum type="arabicPeriod"/>
+            </a:pPr>
+            <a:r>
+              <a:rPr lang="de-DE" sz="1000" dirty="0" err="1"/>
+              <a:t>Decide</a:t>
+            </a:r>
+            <a:r>
+              <a:rPr lang="de-DE" sz="1000" dirty="0"/>
+              <a:t> </a:t>
+            </a:r>
+            <a:r>
+              <a:rPr lang="de-DE" sz="1000" dirty="0" err="1"/>
+              <a:t>for</a:t>
+            </a:r>
+            <a:r>
+              <a:rPr lang="de-DE" sz="1000" dirty="0"/>
+              <a:t> </a:t>
+            </a:r>
+            <a:r>
+              <a:rPr lang="de-DE" sz="1000" dirty="0" err="1"/>
+              <a:t>unlabeled</a:t>
+            </a:r>
+            <a:r>
+              <a:rPr lang="de-DE" sz="1000" dirty="0"/>
+              <a:t>, lots of different </a:t>
+            </a:r>
+            <a:r>
+              <a:rPr lang="de-DE" sz="1000" dirty="0" err="1"/>
+              <a:t>approaches</a:t>
+            </a:r>
+            <a:r>
+              <a:rPr lang="de-DE" sz="1000" dirty="0"/>
+              <a:t> </a:t>
+            </a:r>
+            <a:r>
+              <a:rPr lang="de-DE" sz="1000" dirty="0" err="1"/>
+              <a:t>rn</a:t>
+            </a:r>
+            <a:r>
+              <a:rPr lang="de-DE" sz="1000" dirty="0"/>
+              <a:t>, </a:t>
+            </a:r>
+            <a:r>
+              <a:rPr lang="de-DE" sz="1000" dirty="0" err="1"/>
+              <a:t>figure</a:t>
+            </a:r>
+            <a:r>
+              <a:rPr lang="de-DE" sz="1000" dirty="0"/>
+              <a:t> out and </a:t>
+            </a:r>
+            <a:r>
+              <a:rPr lang="de-DE" sz="1000" dirty="0" err="1"/>
+              <a:t>compare</a:t>
+            </a:r>
+            <a:r>
+              <a:rPr lang="de-DE" sz="1000" dirty="0"/>
+              <a:t> </a:t>
+            </a:r>
+            <a:r>
+              <a:rPr lang="de-DE" sz="1000" dirty="0" err="1"/>
+              <a:t>against</a:t>
+            </a:r>
+            <a:endParaRPr lang="de-DE" sz="1000" dirty="0"/>
+          </a:p>
+          <a:p>
+            <a:pPr marL="628650" lvl="1" indent="-171450">
+              <a:spcAft>
+                <a:spcPts val="600"/>
+              </a:spcAft>
+              <a:buClr>
+                <a:schemeClr val="tx2"/>
+              </a:buClr>
+              <a:buFont typeface="Arial" panose="020B0604020202020204" pitchFamily="34" charset="0"/>
+              <a:buChar char="•"/>
+            </a:pPr>
+            <a:r>
+              <a:rPr lang="de-DE" sz="1000" dirty="0"/>
+              <a:t>BERT ( but </a:t>
+            </a:r>
+            <a:r>
+              <a:rPr lang="de-DE" sz="1000" dirty="0" err="1"/>
+              <a:t>what</a:t>
+            </a:r>
+            <a:r>
+              <a:rPr lang="de-DE" sz="1000" dirty="0"/>
+              <a:t> </a:t>
+            </a:r>
+            <a:r>
+              <a:rPr lang="de-DE" sz="1000" dirty="0" err="1"/>
+              <a:t>kind</a:t>
+            </a:r>
+            <a:r>
+              <a:rPr lang="de-DE" sz="1000" dirty="0"/>
+              <a:t>? </a:t>
+            </a:r>
+            <a:r>
+              <a:rPr lang="de-DE" sz="1000" dirty="0" err="1"/>
+              <a:t>Pre</a:t>
+            </a:r>
+            <a:r>
+              <a:rPr lang="de-DE" sz="1000" dirty="0"/>
+              <a:t> </a:t>
+            </a:r>
+            <a:r>
+              <a:rPr lang="de-DE" sz="1000" dirty="0" err="1"/>
+              <a:t>trained</a:t>
+            </a:r>
+            <a:r>
+              <a:rPr lang="de-DE" sz="1000" dirty="0"/>
+              <a:t> </a:t>
+            </a:r>
+            <a:r>
+              <a:rPr lang="de-DE" sz="1000" dirty="0" err="1"/>
+              <a:t>models</a:t>
+            </a:r>
+            <a:r>
+              <a:rPr lang="de-DE" sz="1000" dirty="0"/>
+              <a:t>? </a:t>
+            </a:r>
+            <a:r>
+              <a:rPr lang="de-DE" sz="1000" dirty="0" err="1"/>
+              <a:t>Which</a:t>
+            </a:r>
+            <a:r>
+              <a:rPr lang="de-DE" sz="1000" dirty="0"/>
+              <a:t> </a:t>
+            </a:r>
+            <a:r>
+              <a:rPr lang="de-DE" sz="1000" dirty="0" err="1"/>
+              <a:t>one</a:t>
+            </a:r>
+            <a:r>
+              <a:rPr lang="de-DE" sz="1000" dirty="0"/>
+              <a:t>? Train </a:t>
+            </a:r>
+            <a:r>
+              <a:rPr lang="de-DE" sz="1000" dirty="0" err="1"/>
+              <a:t>my</a:t>
+            </a:r>
+            <a:r>
+              <a:rPr lang="de-DE" sz="1000" dirty="0"/>
+              <a:t> own?) </a:t>
+            </a:r>
+          </a:p>
+          <a:p>
+            <a:pPr marL="628650" lvl="1" indent="-171450">
+              <a:spcAft>
+                <a:spcPts val="600"/>
+              </a:spcAft>
+              <a:buClr>
+                <a:schemeClr val="tx2"/>
+              </a:buClr>
+              <a:buFont typeface="Arial" panose="020B0604020202020204" pitchFamily="34" charset="0"/>
+              <a:buChar char="•"/>
+            </a:pPr>
+            <a:r>
+              <a:rPr lang="de-DE" sz="1000" dirty="0" err="1"/>
+              <a:t>SecureBERT</a:t>
+            </a:r>
+            <a:r>
+              <a:rPr lang="de-DE" sz="1000" dirty="0"/>
+              <a:t> </a:t>
+            </a:r>
+            <a:r>
+              <a:rPr lang="de-DE" sz="1000" dirty="0" err="1"/>
+              <a:t>could</a:t>
+            </a:r>
+            <a:r>
+              <a:rPr lang="de-DE" sz="1000" dirty="0"/>
+              <a:t> </a:t>
+            </a:r>
+            <a:r>
+              <a:rPr lang="de-DE" sz="1000" dirty="0" err="1"/>
+              <a:t>be</a:t>
+            </a:r>
+            <a:r>
+              <a:rPr lang="de-DE" sz="1000" dirty="0"/>
+              <a:t> </a:t>
+            </a:r>
+            <a:r>
+              <a:rPr lang="de-DE" sz="1000" dirty="0" err="1"/>
+              <a:t>useful</a:t>
+            </a:r>
+            <a:r>
+              <a:rPr lang="de-DE" sz="1000" dirty="0"/>
+              <a:t> </a:t>
+            </a:r>
+            <a:r>
+              <a:rPr lang="de-DE" sz="1000" dirty="0" err="1"/>
+              <a:t>for</a:t>
+            </a:r>
+            <a:r>
+              <a:rPr lang="de-DE" sz="1000" dirty="0"/>
+              <a:t> log-file </a:t>
+            </a:r>
+            <a:r>
+              <a:rPr lang="de-DE" sz="1000" dirty="0" err="1"/>
+              <a:t>use</a:t>
+            </a:r>
+            <a:r>
+              <a:rPr lang="de-DE" sz="1000" dirty="0"/>
+              <a:t> </a:t>
+            </a:r>
+            <a:r>
+              <a:rPr lang="de-DE" sz="1000" dirty="0" err="1"/>
+              <a:t>case</a:t>
+            </a:r>
+            <a:endParaRPr lang="de-DE" sz="1000" dirty="0"/>
+          </a:p>
+          <a:p>
+            <a:pPr marL="628650" lvl="1" indent="-171450">
+              <a:spcAft>
+                <a:spcPts val="600"/>
+              </a:spcAft>
+              <a:buClr>
+                <a:schemeClr val="tx2"/>
+              </a:buClr>
+              <a:buFont typeface="Arial" panose="020B0604020202020204" pitchFamily="34" charset="0"/>
+              <a:buChar char="•"/>
+            </a:pPr>
+            <a:endParaRPr lang="de-DE" sz="1000" dirty="0"/>
+          </a:p>
+        </p:txBody>
+      </p:sp>
+      <p:sp>
+        <p:nvSpPr>
+          <p:cNvPr id="5" name="TextBox 4">
+            <a:extLst>
+              <a:ext uri="{FF2B5EF4-FFF2-40B4-BE49-F238E27FC236}">
+                <a16:creationId xmlns:a16="http://schemas.microsoft.com/office/drawing/2014/main" id="{975E1CFB-075F-6A3E-FB78-F5183BC102C7}"/>
+              </a:ext>
+            </a:extLst>
+          </p:cNvPr>
+          <p:cNvSpPr txBox="1"/>
+          <p:nvPr/>
+        </p:nvSpPr>
+        <p:spPr>
+          <a:xfrm>
+            <a:off x="8151223" y="254290"/>
+            <a:ext cx="3152503" cy="1215717"/>
+          </a:xfrm>
+          <a:prstGeom prst="rect">
+            <a:avLst/>
+          </a:prstGeom>
+        </p:spPr>
+        <p:style>
+          <a:lnRef idx="1">
+            <a:schemeClr val="accent2"/>
+          </a:lnRef>
+          <a:fillRef idx="2">
+            <a:schemeClr val="accent2"/>
+          </a:fillRef>
+          <a:effectRef idx="1">
+            <a:schemeClr val="accent2"/>
+          </a:effectRef>
+          <a:fontRef idx="minor">
+            <a:schemeClr val="dk1"/>
+          </a:fontRef>
+        </p:style>
+        <p:txBody>
+          <a:bodyPr vert="horz" wrap="square" lIns="0" tIns="0" rIns="0" bIns="0" rtlCol="0">
+            <a:spAutoFit/>
+          </a:bodyPr>
+          <a:lstStyle/>
+          <a:p>
+            <a:pPr marL="0" indent="0" algn="l" defTabSz="914400" rtl="0" eaLnBrk="1" latinLnBrk="0" hangingPunct="1">
+              <a:lnSpc>
+                <a:spcPct val="100000"/>
+              </a:lnSpc>
+              <a:spcBef>
+                <a:spcPts val="0"/>
+              </a:spcBef>
+              <a:spcAft>
+                <a:spcPts val="600"/>
+              </a:spcAft>
+              <a:buClr>
+                <a:schemeClr val="tx2"/>
+              </a:buClr>
+              <a:buFontTx/>
+              <a:buNone/>
+            </a:pPr>
+            <a:r>
+              <a:rPr lang="de-DE" sz="900" b="1" u="sng" dirty="0"/>
+              <a:t>Main </a:t>
+            </a:r>
+            <a:r>
+              <a:rPr lang="de-DE" sz="900" b="1" u="sng" dirty="0" err="1"/>
+              <a:t>Ressources</a:t>
+            </a:r>
+            <a:r>
+              <a:rPr lang="de-DE" sz="900" b="1" u="sng" dirty="0"/>
+              <a:t> </a:t>
+            </a:r>
+            <a:r>
+              <a:rPr lang="de-DE" sz="900" b="1" u="sng" dirty="0" err="1"/>
+              <a:t>as</a:t>
+            </a:r>
+            <a:r>
+              <a:rPr lang="de-DE" sz="900" b="1" u="sng" dirty="0"/>
+              <a:t> of </a:t>
+            </a:r>
+            <a:r>
+              <a:rPr lang="de-DE" sz="900" b="1" u="sng" dirty="0" err="1"/>
+              <a:t>now</a:t>
+            </a:r>
+            <a:r>
+              <a:rPr lang="de-DE" sz="900" b="1" u="sng" dirty="0"/>
+              <a:t>:</a:t>
+            </a:r>
+            <a:r>
+              <a:rPr lang="de-DE" sz="900" dirty="0"/>
+              <a:t> </a:t>
+            </a:r>
+            <a:endParaRPr lang="de-DE" sz="900" kern="1200" dirty="0">
+              <a:solidFill>
+                <a:schemeClr val="tx1"/>
+              </a:solidFill>
+              <a:latin typeface="+mn-lt"/>
+              <a:ea typeface="+mn-ea"/>
+              <a:cs typeface="+mn-cs"/>
+            </a:endParaRPr>
+          </a:p>
+          <a:p>
+            <a:pPr marL="0" indent="0" algn="l" defTabSz="914400" rtl="0" eaLnBrk="1" latinLnBrk="0" hangingPunct="1">
+              <a:lnSpc>
+                <a:spcPct val="100000"/>
+              </a:lnSpc>
+              <a:spcBef>
+                <a:spcPts val="0"/>
+              </a:spcBef>
+              <a:spcAft>
+                <a:spcPts val="600"/>
+              </a:spcAft>
+              <a:buClr>
+                <a:schemeClr val="tx2"/>
+              </a:buClr>
+              <a:buFontTx/>
+              <a:buNone/>
+            </a:pPr>
+            <a:r>
+              <a:rPr lang="de-DE" sz="900" kern="1200" dirty="0">
+                <a:solidFill>
+                  <a:schemeClr val="tx1"/>
+                </a:solidFill>
+                <a:latin typeface="+mn-lt"/>
+                <a:ea typeface="+mn-ea"/>
+                <a:cs typeface="+mn-cs"/>
+              </a:rPr>
+              <a:t>- </a:t>
+            </a:r>
+            <a:r>
+              <a:rPr lang="de-DE" sz="900" kern="1200" dirty="0" err="1">
+                <a:solidFill>
+                  <a:schemeClr val="tx1"/>
+                </a:solidFill>
+                <a:latin typeface="+mn-lt"/>
+                <a:ea typeface="+mn-ea"/>
+                <a:cs typeface="+mn-cs"/>
+              </a:rPr>
+              <a:t>SecureBERT</a:t>
+            </a:r>
+            <a:r>
+              <a:rPr lang="de-DE" sz="900" kern="1200" dirty="0">
+                <a:solidFill>
+                  <a:schemeClr val="tx1"/>
+                </a:solidFill>
+                <a:latin typeface="+mn-lt"/>
+                <a:ea typeface="+mn-ea"/>
+                <a:cs typeface="+mn-cs"/>
+              </a:rPr>
+              <a:t>:  </a:t>
+            </a:r>
+            <a:r>
+              <a:rPr lang="de-DE" sz="900" kern="1200" dirty="0">
+                <a:solidFill>
+                  <a:schemeClr val="tx1"/>
+                </a:solidFill>
+                <a:latin typeface="+mn-lt"/>
+                <a:ea typeface="+mn-ea"/>
+                <a:cs typeface="+mn-cs"/>
+                <a:hlinkClick r:id="rId2"/>
+              </a:rPr>
+              <a:t>https://arxiv.org/abs/2204.02685</a:t>
+            </a:r>
+            <a:endParaRPr lang="de-DE" sz="900" kern="1200" dirty="0">
+              <a:solidFill>
+                <a:schemeClr val="tx1"/>
+              </a:solidFill>
+              <a:latin typeface="+mn-lt"/>
+              <a:ea typeface="+mn-ea"/>
+              <a:cs typeface="+mn-cs"/>
+            </a:endParaRPr>
+          </a:p>
+          <a:p>
+            <a:pPr marL="0" indent="0" algn="l" defTabSz="914400" rtl="0" eaLnBrk="1" latinLnBrk="0" hangingPunct="1">
+              <a:lnSpc>
+                <a:spcPct val="100000"/>
+              </a:lnSpc>
+              <a:spcBef>
+                <a:spcPts val="0"/>
+              </a:spcBef>
+              <a:spcAft>
+                <a:spcPts val="600"/>
+              </a:spcAft>
+              <a:buClr>
+                <a:schemeClr val="tx2"/>
+              </a:buClr>
+              <a:buFontTx/>
+              <a:buNone/>
+            </a:pPr>
+            <a:r>
+              <a:rPr lang="de-DE" sz="900" dirty="0"/>
+              <a:t>- </a:t>
+            </a:r>
+            <a:r>
+              <a:rPr lang="de-DE" sz="900" dirty="0" err="1"/>
+              <a:t>Deduplicating</a:t>
+            </a:r>
+            <a:r>
+              <a:rPr lang="de-DE" sz="900" dirty="0"/>
+              <a:t> Data:  </a:t>
+            </a:r>
+            <a:r>
+              <a:rPr lang="de-DE" sz="900" dirty="0">
+                <a:hlinkClick r:id="rId3"/>
+              </a:rPr>
+              <a:t>http://arxiv.org/abs/2107.06499</a:t>
+            </a:r>
+            <a:endParaRPr lang="de-DE" sz="900" dirty="0"/>
+          </a:p>
+          <a:p>
+            <a:pPr marL="0" indent="0" algn="l" defTabSz="914400" rtl="0" eaLnBrk="1" latinLnBrk="0" hangingPunct="1">
+              <a:lnSpc>
+                <a:spcPct val="100000"/>
+              </a:lnSpc>
+              <a:spcBef>
+                <a:spcPts val="0"/>
+              </a:spcBef>
+              <a:spcAft>
+                <a:spcPts val="600"/>
+              </a:spcAft>
+              <a:buClr>
+                <a:schemeClr val="tx2"/>
+              </a:buClr>
+              <a:buFontTx/>
+              <a:buNone/>
+            </a:pPr>
+            <a:r>
+              <a:rPr lang="de-DE" sz="900" dirty="0"/>
+              <a:t>- </a:t>
+            </a:r>
+            <a:r>
+              <a:rPr lang="de-DE" sz="900" dirty="0" err="1"/>
+              <a:t>Confident</a:t>
+            </a:r>
+            <a:r>
+              <a:rPr lang="de-DE" sz="900" dirty="0"/>
+              <a:t> Learning: </a:t>
+            </a:r>
+            <a:r>
+              <a:rPr lang="de-DE" sz="900" dirty="0">
+                <a:hlinkClick r:id="rId4"/>
+              </a:rPr>
+              <a:t>http://arxiv.org/abs/1911.00068</a:t>
+            </a:r>
+            <a:endParaRPr lang="de-DE" sz="900" dirty="0"/>
+          </a:p>
+          <a:p>
+            <a:pPr marL="0" indent="0" algn="l" defTabSz="914400" rtl="0" eaLnBrk="1" latinLnBrk="0" hangingPunct="1">
+              <a:lnSpc>
+                <a:spcPct val="100000"/>
+              </a:lnSpc>
+              <a:spcBef>
+                <a:spcPts val="0"/>
+              </a:spcBef>
+              <a:spcAft>
+                <a:spcPts val="600"/>
+              </a:spcAft>
+              <a:buClr>
+                <a:schemeClr val="tx2"/>
+              </a:buClr>
+              <a:buFontTx/>
+              <a:buNone/>
+            </a:pPr>
+            <a:r>
+              <a:rPr lang="de-DE" sz="900" dirty="0"/>
+              <a:t>- BERT: </a:t>
+            </a:r>
+            <a:r>
+              <a:rPr lang="de-DE" sz="900" dirty="0">
+                <a:hlinkClick r:id="rId5"/>
+              </a:rPr>
+              <a:t>http://arxiv.org/abs/2204.02685</a:t>
+            </a:r>
+            <a:endParaRPr lang="de-DE" sz="900" dirty="0"/>
+          </a:p>
+          <a:p>
+            <a:pPr marL="0" indent="0" algn="l" defTabSz="914400" rtl="0" eaLnBrk="1" latinLnBrk="0" hangingPunct="1">
+              <a:lnSpc>
+                <a:spcPct val="100000"/>
+              </a:lnSpc>
+              <a:spcBef>
+                <a:spcPts val="0"/>
+              </a:spcBef>
+              <a:spcAft>
+                <a:spcPts val="600"/>
+              </a:spcAft>
+              <a:buClr>
+                <a:schemeClr val="tx2"/>
+              </a:buClr>
+              <a:buFontTx/>
+              <a:buNone/>
+            </a:pPr>
+            <a:r>
+              <a:rPr lang="de-DE" sz="900" dirty="0"/>
+              <a:t>Attention </a:t>
+            </a:r>
+            <a:r>
+              <a:rPr lang="de-DE" sz="900" dirty="0" err="1"/>
+              <a:t>is</a:t>
+            </a:r>
+            <a:r>
+              <a:rPr lang="de-DE" sz="900" dirty="0"/>
+              <a:t> all: </a:t>
+            </a:r>
+            <a:r>
+              <a:rPr lang="de-DE" sz="900" dirty="0">
+                <a:hlinkClick r:id="rId6"/>
+              </a:rPr>
+              <a:t>http://arxiv.org/abs/1706.03762</a:t>
+            </a:r>
+            <a:endParaRPr lang="de-DE" sz="900" dirty="0"/>
+          </a:p>
+        </p:txBody>
+      </p:sp>
+    </p:spTree>
+    <p:extLst>
+      <p:ext uri="{BB962C8B-B14F-4D97-AF65-F5344CB8AC3E}">
+        <p14:creationId xmlns:p14="http://schemas.microsoft.com/office/powerpoint/2010/main" val="4005258961"/>
+      </p:ext>
+    </p:extLst>
+  </p:cSld>
+  <p:clrMapOvr>
+    <a:masterClrMapping/>
+  </p:clrMapOvr>
+</p:sld>
+</file>
+
+<file path=ppt/slides/slide16.xml><?xml version="1.0" encoding="utf-8"?>
+<p:sld xmlns:a="http://schemas.openxmlformats.org/drawingml/2006/main" xmlns:r="http://schemas.openxmlformats.org/officeDocument/2006/relationships" xmlns:p="http://schemas.openxmlformats.org/presentationml/2006/main">
+  <p:cSld>
+    <p:spTree>
+      <p:nvGrpSpPr>
+        <p:cNvPr id="1" name=""/>
+        <p:cNvGrpSpPr/>
+        <p:nvPr/>
+      </p:nvGrpSpPr>
+      <p:grpSpPr>
+        <a:xfrm>
+          <a:off x="0" y="0"/>
+          <a:ext cx="0" cy="0"/>
+          <a:chOff x="0" y="0"/>
+          <a:chExt cx="0" cy="0"/>
+        </a:xfrm>
+      </p:grpSpPr>
+      <p:sp>
+        <p:nvSpPr>
+          <p:cNvPr id="2" name="Title 1">
+            <a:extLst>
+              <a:ext uri="{FF2B5EF4-FFF2-40B4-BE49-F238E27FC236}">
+                <a16:creationId xmlns:a16="http://schemas.microsoft.com/office/drawing/2014/main" id="{CC602EF1-3F43-7235-3C14-52EE7D7F06A7}"/>
+              </a:ext>
+            </a:extLst>
+          </p:cNvPr>
+          <p:cNvSpPr>
+            <a:spLocks noGrp="1"/>
+          </p:cNvSpPr>
+          <p:nvPr>
+            <p:ph type="title"/>
+          </p:nvPr>
+        </p:nvSpPr>
+        <p:spPr>
+          <a:xfrm>
+            <a:off x="488947" y="347184"/>
+            <a:ext cx="2559053" cy="800219"/>
+          </a:xfrm>
+        </p:spPr>
+        <p:txBody>
+          <a:bodyPr/>
+          <a:lstStyle/>
+          <a:p>
+            <a:r>
+              <a:rPr lang="de-DE" dirty="0"/>
+              <a:t>Notes BA-</a:t>
+            </a:r>
+            <a:r>
+              <a:rPr lang="de-DE" dirty="0" err="1"/>
+              <a:t>Sync</a:t>
+            </a:r>
+            <a:r>
+              <a:rPr lang="de-DE" dirty="0"/>
+              <a:t> – 27.06.2024 (3/4)</a:t>
+            </a:r>
+            <a:endParaRPr lang="en-US" dirty="0"/>
+          </a:p>
+        </p:txBody>
+      </p:sp>
+      <p:pic>
+        <p:nvPicPr>
+          <p:cNvPr id="6" name="Picture 5">
+            <a:extLst>
+              <a:ext uri="{FF2B5EF4-FFF2-40B4-BE49-F238E27FC236}">
+                <a16:creationId xmlns:a16="http://schemas.microsoft.com/office/drawing/2014/main" id="{90162104-FCDD-DC82-74E0-9A9ABDE56085}"/>
+              </a:ext>
+            </a:extLst>
+          </p:cNvPr>
+          <p:cNvPicPr>
+            <a:picLocks noChangeAspect="1"/>
+          </p:cNvPicPr>
+          <p:nvPr/>
+        </p:nvPicPr>
+        <p:blipFill>
+          <a:blip r:embed="rId2"/>
+          <a:stretch>
+            <a:fillRect/>
+          </a:stretch>
+        </p:blipFill>
+        <p:spPr>
+          <a:xfrm>
+            <a:off x="4040845" y="0"/>
+            <a:ext cx="5521166" cy="6689267"/>
+          </a:xfrm>
+          <a:prstGeom prst="rect">
+            <a:avLst/>
+          </a:prstGeom>
+        </p:spPr>
+      </p:pic>
+      <p:sp>
+        <p:nvSpPr>
+          <p:cNvPr id="11" name="TextBox 10">
+            <a:extLst>
+              <a:ext uri="{FF2B5EF4-FFF2-40B4-BE49-F238E27FC236}">
+                <a16:creationId xmlns:a16="http://schemas.microsoft.com/office/drawing/2014/main" id="{586C77E3-7A96-74BE-05BF-DFB15333DF82}"/>
+              </a:ext>
+            </a:extLst>
+          </p:cNvPr>
+          <p:cNvSpPr txBox="1"/>
+          <p:nvPr/>
+        </p:nvSpPr>
+        <p:spPr>
+          <a:xfrm>
+            <a:off x="2238102" y="2376281"/>
+            <a:ext cx="1994263" cy="276999"/>
+          </a:xfrm>
+          <a:prstGeom prst="rect">
+            <a:avLst/>
+          </a:prstGeom>
+        </p:spPr>
+        <p:txBody>
+          <a:bodyPr vert="horz" wrap="square" lIns="0" tIns="0" rIns="0" bIns="0" rtlCol="0">
+            <a:spAutoFit/>
+          </a:bodyPr>
+          <a:lstStyle/>
+          <a:p>
+            <a:pPr marL="0" indent="0" algn="l" defTabSz="914400" rtl="0" eaLnBrk="1" latinLnBrk="0" hangingPunct="1">
+              <a:lnSpc>
+                <a:spcPct val="100000"/>
+              </a:lnSpc>
+              <a:spcBef>
+                <a:spcPts val="0"/>
+              </a:spcBef>
+              <a:spcAft>
+                <a:spcPts val="600"/>
+              </a:spcAft>
+              <a:buClr>
+                <a:schemeClr val="tx2"/>
+              </a:buClr>
+              <a:buFontTx/>
+              <a:buNone/>
+            </a:pPr>
+            <a:r>
+              <a:rPr lang="de-DE" sz="1800" kern="1200" dirty="0" err="1">
+                <a:solidFill>
+                  <a:schemeClr val="tx1"/>
+                </a:solidFill>
+                <a:latin typeface="+mn-lt"/>
+                <a:ea typeface="+mn-ea"/>
+                <a:cs typeface="+mn-cs"/>
+              </a:rPr>
+              <a:t>Example</a:t>
+            </a:r>
+            <a:r>
+              <a:rPr lang="de-DE" sz="1800" kern="1200" dirty="0">
+                <a:solidFill>
+                  <a:schemeClr val="tx1"/>
+                </a:solidFill>
+                <a:latin typeface="+mn-lt"/>
+                <a:ea typeface="+mn-ea"/>
+                <a:cs typeface="+mn-cs"/>
+              </a:rPr>
+              <a:t> </a:t>
+            </a:r>
+            <a:r>
+              <a:rPr lang="de-DE" sz="1800" kern="1200" dirty="0" err="1">
+                <a:solidFill>
+                  <a:schemeClr val="tx1"/>
+                </a:solidFill>
+                <a:latin typeface="+mn-lt"/>
+                <a:ea typeface="+mn-ea"/>
+                <a:cs typeface="+mn-cs"/>
+              </a:rPr>
+              <a:t>cases</a:t>
+            </a:r>
+            <a:r>
+              <a:rPr lang="de-DE" sz="1800" kern="1200" dirty="0">
+                <a:solidFill>
+                  <a:schemeClr val="tx1"/>
+                </a:solidFill>
+                <a:latin typeface="+mn-lt"/>
+                <a:ea typeface="+mn-ea"/>
+                <a:cs typeface="+mn-cs"/>
+              </a:rPr>
+              <a:t> </a:t>
+            </a:r>
+            <a:r>
+              <a:rPr lang="de-DE" sz="1800" kern="1200" dirty="0">
+                <a:solidFill>
+                  <a:schemeClr val="tx1"/>
+                </a:solidFill>
+                <a:latin typeface="+mn-lt"/>
+                <a:ea typeface="+mn-ea"/>
+                <a:cs typeface="+mn-cs"/>
+                <a:sym typeface="Wingdings" panose="05000000000000000000" pitchFamily="2" charset="2"/>
+              </a:rPr>
+              <a:t></a:t>
+            </a:r>
+            <a:endParaRPr lang="de-DE" sz="1800" kern="1200" dirty="0">
+              <a:solidFill>
+                <a:schemeClr val="tx1"/>
+              </a:solidFill>
+              <a:latin typeface="+mn-lt"/>
+              <a:ea typeface="+mn-ea"/>
+              <a:cs typeface="+mn-cs"/>
+            </a:endParaRPr>
+          </a:p>
+        </p:txBody>
+      </p:sp>
+    </p:spTree>
+    <p:extLst>
+      <p:ext uri="{BB962C8B-B14F-4D97-AF65-F5344CB8AC3E}">
+        <p14:creationId xmlns:p14="http://schemas.microsoft.com/office/powerpoint/2010/main" val="2766703198"/>
+      </p:ext>
+    </p:extLst>
+  </p:cSld>
+  <p:clrMapOvr>
+    <a:masterClrMapping/>
+  </p:clrMapOvr>
+</p:sld>
+</file>
+
+<file path=ppt/slides/slide17.xml><?xml version="1.0" encoding="utf-8"?>
+<p:sld xmlns:a="http://schemas.openxmlformats.org/drawingml/2006/main" xmlns:r="http://schemas.openxmlformats.org/officeDocument/2006/relationships" xmlns:p="http://schemas.openxmlformats.org/presentationml/2006/main">
+  <p:cSld>
+    <p:spTree>
+      <p:nvGrpSpPr>
+        <p:cNvPr id="1" name=""/>
+        <p:cNvGrpSpPr/>
+        <p:nvPr/>
+      </p:nvGrpSpPr>
+      <p:grpSpPr>
+        <a:xfrm>
+          <a:off x="0" y="0"/>
+          <a:ext cx="0" cy="0"/>
+          <a:chOff x="0" y="0"/>
+          <a:chExt cx="0" cy="0"/>
+        </a:xfrm>
+      </p:grpSpPr>
+      <p:sp>
+        <p:nvSpPr>
+          <p:cNvPr id="2" name="Title 1">
+            <a:extLst>
+              <a:ext uri="{FF2B5EF4-FFF2-40B4-BE49-F238E27FC236}">
+                <a16:creationId xmlns:a16="http://schemas.microsoft.com/office/drawing/2014/main" id="{CC602EF1-3F43-7235-3C14-52EE7D7F06A7}"/>
+              </a:ext>
+            </a:extLst>
+          </p:cNvPr>
+          <p:cNvSpPr>
+            <a:spLocks noGrp="1"/>
+          </p:cNvSpPr>
+          <p:nvPr>
+            <p:ph type="title"/>
+          </p:nvPr>
+        </p:nvSpPr>
+        <p:spPr>
+          <a:xfrm>
+            <a:off x="488947" y="347184"/>
+            <a:ext cx="2559053" cy="800219"/>
+          </a:xfrm>
+        </p:spPr>
+        <p:txBody>
+          <a:bodyPr/>
+          <a:lstStyle/>
+          <a:p>
+            <a:r>
+              <a:rPr lang="de-DE" dirty="0"/>
+              <a:t>Notes BA-</a:t>
+            </a:r>
+            <a:r>
+              <a:rPr lang="de-DE" dirty="0" err="1"/>
+              <a:t>Sync</a:t>
+            </a:r>
+            <a:r>
+              <a:rPr lang="de-DE" dirty="0"/>
+              <a:t> – 27.06.2024 (4/4)</a:t>
+            </a:r>
+            <a:endParaRPr lang="en-US" dirty="0"/>
+          </a:p>
+        </p:txBody>
+      </p:sp>
+      <p:sp>
+        <p:nvSpPr>
+          <p:cNvPr id="11" name="TextBox 10">
+            <a:extLst>
+              <a:ext uri="{FF2B5EF4-FFF2-40B4-BE49-F238E27FC236}">
+                <a16:creationId xmlns:a16="http://schemas.microsoft.com/office/drawing/2014/main" id="{586C77E3-7A96-74BE-05BF-DFB15333DF82}"/>
+              </a:ext>
+            </a:extLst>
+          </p:cNvPr>
+          <p:cNvSpPr txBox="1"/>
+          <p:nvPr/>
+        </p:nvSpPr>
+        <p:spPr>
+          <a:xfrm>
+            <a:off x="2151016" y="1906019"/>
+            <a:ext cx="1994263" cy="276999"/>
+          </a:xfrm>
+          <a:prstGeom prst="rect">
+            <a:avLst/>
+          </a:prstGeom>
+        </p:spPr>
+        <p:txBody>
+          <a:bodyPr vert="horz" wrap="square" lIns="0" tIns="0" rIns="0" bIns="0" rtlCol="0">
+            <a:spAutoFit/>
+          </a:bodyPr>
+          <a:lstStyle/>
+          <a:p>
+            <a:pPr marL="0" indent="0" algn="l" defTabSz="914400" rtl="0" eaLnBrk="1" latinLnBrk="0" hangingPunct="1">
+              <a:lnSpc>
+                <a:spcPct val="100000"/>
+              </a:lnSpc>
+              <a:spcBef>
+                <a:spcPts val="0"/>
+              </a:spcBef>
+              <a:spcAft>
+                <a:spcPts val="600"/>
+              </a:spcAft>
+              <a:buClr>
+                <a:schemeClr val="tx2"/>
+              </a:buClr>
+              <a:buFontTx/>
+              <a:buNone/>
+            </a:pPr>
+            <a:r>
+              <a:rPr lang="de-DE" sz="1800" kern="1200" dirty="0" err="1">
+                <a:solidFill>
+                  <a:schemeClr val="tx1"/>
+                </a:solidFill>
+                <a:latin typeface="+mn-lt"/>
+                <a:ea typeface="+mn-ea"/>
+                <a:cs typeface="+mn-cs"/>
+              </a:rPr>
+              <a:t>Overview</a:t>
+            </a:r>
+            <a:endParaRPr lang="de-DE" sz="1800" kern="1200" dirty="0">
+              <a:solidFill>
+                <a:schemeClr val="tx1"/>
+              </a:solidFill>
+              <a:latin typeface="+mn-lt"/>
+              <a:ea typeface="+mn-ea"/>
+              <a:cs typeface="+mn-cs"/>
+            </a:endParaRPr>
+          </a:p>
+        </p:txBody>
+      </p:sp>
+      <p:pic>
+        <p:nvPicPr>
+          <p:cNvPr id="3" name="Picture 2">
+            <a:extLst>
+              <a:ext uri="{FF2B5EF4-FFF2-40B4-BE49-F238E27FC236}">
+                <a16:creationId xmlns:a16="http://schemas.microsoft.com/office/drawing/2014/main" id="{7F40D045-4E1B-A2C3-1495-BE7CF48913C1}"/>
+              </a:ext>
+            </a:extLst>
+          </p:cNvPr>
+          <p:cNvPicPr>
+            <a:picLocks noChangeAspect="1"/>
+          </p:cNvPicPr>
+          <p:nvPr/>
+        </p:nvPicPr>
+        <p:blipFill>
+          <a:blip r:embed="rId2"/>
+          <a:stretch>
+            <a:fillRect/>
+          </a:stretch>
+        </p:blipFill>
+        <p:spPr>
+          <a:xfrm>
+            <a:off x="0" y="2279297"/>
+            <a:ext cx="12192000" cy="3451009"/>
+          </a:xfrm>
+          <a:prstGeom prst="rect">
+            <a:avLst/>
+          </a:prstGeom>
+        </p:spPr>
+      </p:pic>
+    </p:spTree>
+    <p:extLst>
+      <p:ext uri="{BB962C8B-B14F-4D97-AF65-F5344CB8AC3E}">
+        <p14:creationId xmlns:p14="http://schemas.microsoft.com/office/powerpoint/2010/main" val="151146317"/>
       </p:ext>
     </p:extLst>
   </p:cSld>

</xml_diff>

<commit_message>
added script for elasticsearch
</commit_message>
<xml_diff>
--- a/dokumentation_things/Roadmap Bachelor thesis.pptx
+++ b/dokumentation_things/Roadmap Bachelor thesis.pptx
@@ -32330,12 +32330,8 @@
               <a:t>details</a:t>
             </a:r>
             <a:r>
-              <a:rPr lang="de-DE"/>
-              <a:t> @ </a:t>
-            </a:r>
-            <a:r>
               <a:rPr lang="de-DE" dirty="0"/>
-              <a:t>4/4) </a:t>
+              <a:t> @ 4/4) </a:t>
             </a:r>
           </a:p>
           <a:p>

</xml_diff>